<commit_message>
Update TinyML - El poder de los microcontroladores.pptx
</commit_message>
<xml_diff>
--- a/TinyML - El poder de los microcontroladores.pptx
+++ b/TinyML - El poder de los microcontroladores.pptx
@@ -11,16 +11,17 @@
     <p:sldId id="260" r:id="rId5"/>
     <p:sldId id="261" r:id="rId6"/>
     <p:sldId id="262" r:id="rId7"/>
+    <p:sldId id="263" r:id="rId8"/>
   </p:sldIdLst>
   <p:sldSz cx="18288000" cy="10287000"/>
   <p:notesSz cx="6858000" cy="9144000"/>
   <p:embeddedFontLst>
     <p:embeddedFont>
       <p:font typeface="Calibri" panose="020F0502020204030204" pitchFamily="34" charset="0"/>
-      <p:regular r:id="rId8"/>
-      <p:bold r:id="rId9"/>
-      <p:italic r:id="rId10"/>
-      <p:boldItalic r:id="rId11"/>
+      <p:regular r:id="rId9"/>
+      <p:bold r:id="rId10"/>
+      <p:italic r:id="rId11"/>
+      <p:boldItalic r:id="rId12"/>
     </p:embeddedFont>
   </p:embeddedFontLst>
   <p:defaultTextStyle>
@@ -140,7 +141,7 @@
 <file path=ppt/revisionInfo.xml><?xml version="1.0" encoding="utf-8"?>
 <p1510:revInfo xmlns:a="http://schemas.openxmlformats.org/drawingml/2006/main" xmlns:r="http://schemas.openxmlformats.org/officeDocument/2006/relationships" xmlns:p1510="http://schemas.microsoft.com/office/powerpoint/2015/10/main">
   <p1510:revLst>
-    <p1510:client id="{89DF80F2-10DB-4A3A-931B-AAB9A75BF15C}" v="112" dt="2023-11-11T13:15:25.491"/>
+    <p1510:client id="{89DF80F2-10DB-4A3A-931B-AAB9A75BF15C}" v="125" dt="2023-11-11T17:59:59.659"/>
   </p1510:revLst>
 </p1510:revInfo>
 </file>
@@ -150,22 +151,46 @@
   <pc:docChgLst>
     <pc:chgData name="OSWALDO EMMANUEL FONSECA URIBE" userId="54165c13-dfa2-4054-a27e-170522c03138" providerId="ADAL" clId="{89DF80F2-10DB-4A3A-931B-AAB9A75BF15C}"/>
     <pc:docChg chg="undo redo custSel addSld delSld modSld sldOrd">
-      <pc:chgData name="OSWALDO EMMANUEL FONSECA URIBE" userId="54165c13-dfa2-4054-a27e-170522c03138" providerId="ADAL" clId="{89DF80F2-10DB-4A3A-931B-AAB9A75BF15C}" dt="2023-11-11T13:15:47.786" v="603" actId="2696"/>
+      <pc:chgData name="OSWALDO EMMANUEL FONSECA URIBE" userId="54165c13-dfa2-4054-a27e-170522c03138" providerId="ADAL" clId="{89DF80F2-10DB-4A3A-931B-AAB9A75BF15C}" dt="2023-11-11T17:59:59.658" v="1125" actId="1076"/>
       <pc:docMkLst>
         <pc:docMk/>
       </pc:docMkLst>
       <pc:sldChg chg="addSp delSp modSp mod modTransition modAnim">
-        <pc:chgData name="OSWALDO EMMANUEL FONSECA URIBE" userId="54165c13-dfa2-4054-a27e-170522c03138" providerId="ADAL" clId="{89DF80F2-10DB-4A3A-931B-AAB9A75BF15C}" dt="2023-11-11T11:05:31.268" v="455" actId="1076"/>
+        <pc:chgData name="OSWALDO EMMANUEL FONSECA URIBE" userId="54165c13-dfa2-4054-a27e-170522c03138" providerId="ADAL" clId="{89DF80F2-10DB-4A3A-931B-AAB9A75BF15C}" dt="2023-11-11T17:53:40.832" v="707" actId="14100"/>
         <pc:sldMkLst>
           <pc:docMk/>
           <pc:sldMk cId="0" sldId="256"/>
         </pc:sldMkLst>
-        <pc:spChg chg="add del topLvl">
-          <ac:chgData name="OSWALDO EMMANUEL FONSECA URIBE" userId="54165c13-dfa2-4054-a27e-170522c03138" providerId="ADAL" clId="{89DF80F2-10DB-4A3A-931B-AAB9A75BF15C}" dt="2023-11-11T07:47:52.976" v="1" actId="478"/>
+        <pc:spChg chg="add del mod topLvl">
+          <ac:chgData name="OSWALDO EMMANUEL FONSECA URIBE" userId="54165c13-dfa2-4054-a27e-170522c03138" providerId="ADAL" clId="{89DF80F2-10DB-4A3A-931B-AAB9A75BF15C}" dt="2023-11-11T17:53:03.815" v="698" actId="164"/>
           <ac:spMkLst>
             <pc:docMk/>
             <pc:sldMk cId="0" sldId="256"/>
             <ac:spMk id="23" creationId="{00000000-0000-0000-0000-000000000000}"/>
+          </ac:spMkLst>
+        </pc:spChg>
+        <pc:spChg chg="mod">
+          <ac:chgData name="OSWALDO EMMANUEL FONSECA URIBE" userId="54165c13-dfa2-4054-a27e-170522c03138" providerId="ADAL" clId="{89DF80F2-10DB-4A3A-931B-AAB9A75BF15C}" dt="2023-11-11T17:53:40.832" v="707" actId="14100"/>
+          <ac:spMkLst>
+            <pc:docMk/>
+            <pc:sldMk cId="0" sldId="256"/>
+            <ac:spMk id="37" creationId="{00000000-0000-0000-0000-000000000000}"/>
+          </ac:spMkLst>
+        </pc:spChg>
+        <pc:spChg chg="mod">
+          <ac:chgData name="OSWALDO EMMANUEL FONSECA URIBE" userId="54165c13-dfa2-4054-a27e-170522c03138" providerId="ADAL" clId="{89DF80F2-10DB-4A3A-931B-AAB9A75BF15C}" dt="2023-11-11T17:53:14.932" v="701" actId="164"/>
+          <ac:spMkLst>
+            <pc:docMk/>
+            <pc:sldMk cId="0" sldId="256"/>
+            <ac:spMk id="38" creationId="{00000000-0000-0000-0000-000000000000}"/>
+          </ac:spMkLst>
+        </pc:spChg>
+        <pc:spChg chg="mod">
+          <ac:chgData name="OSWALDO EMMANUEL FONSECA URIBE" userId="54165c13-dfa2-4054-a27e-170522c03138" providerId="ADAL" clId="{89DF80F2-10DB-4A3A-931B-AAB9A75BF15C}" dt="2023-11-11T17:53:03.815" v="698" actId="164"/>
+          <ac:spMkLst>
+            <pc:docMk/>
+            <pc:sldMk cId="0" sldId="256"/>
+            <ac:spMk id="41" creationId="{00000000-0000-0000-0000-000000000000}"/>
           </ac:spMkLst>
         </pc:spChg>
         <pc:spChg chg="mod">
@@ -184,6 +209,22 @@
             <ac:grpSpMk id="13" creationId="{00000000-0000-0000-0000-000000000000}"/>
           </ac:grpSpMkLst>
         </pc:grpChg>
+        <pc:grpChg chg="mod">
+          <ac:chgData name="OSWALDO EMMANUEL FONSECA URIBE" userId="54165c13-dfa2-4054-a27e-170522c03138" providerId="ADAL" clId="{89DF80F2-10DB-4A3A-931B-AAB9A75BF15C}" dt="2023-11-11T17:53:03.815" v="698" actId="164"/>
+          <ac:grpSpMkLst>
+            <pc:docMk/>
+            <pc:sldMk cId="0" sldId="256"/>
+            <ac:grpSpMk id="18" creationId="{00000000-0000-0000-0000-000000000000}"/>
+          </ac:grpSpMkLst>
+        </pc:grpChg>
+        <pc:grpChg chg="mod">
+          <ac:chgData name="OSWALDO EMMANUEL FONSECA URIBE" userId="54165c13-dfa2-4054-a27e-170522c03138" providerId="ADAL" clId="{89DF80F2-10DB-4A3A-931B-AAB9A75BF15C}" dt="2023-11-11T17:53:03.815" v="698" actId="164"/>
+          <ac:grpSpMkLst>
+            <pc:docMk/>
+            <pc:sldMk cId="0" sldId="256"/>
+            <ac:grpSpMk id="20" creationId="{00000000-0000-0000-0000-000000000000}"/>
+          </ac:grpSpMkLst>
+        </pc:grpChg>
         <pc:grpChg chg="del">
           <ac:chgData name="OSWALDO EMMANUEL FONSECA URIBE" userId="54165c13-dfa2-4054-a27e-170522c03138" providerId="ADAL" clId="{89DF80F2-10DB-4A3A-931B-AAB9A75BF15C}" dt="2023-11-11T07:47:51.968" v="0" actId="478"/>
           <ac:grpSpMkLst>
@@ -192,12 +233,44 @@
             <ac:grpSpMk id="22" creationId="{00000000-0000-0000-0000-000000000000}"/>
           </ac:grpSpMkLst>
         </pc:grpChg>
+        <pc:grpChg chg="add mod">
+          <ac:chgData name="OSWALDO EMMANUEL FONSECA URIBE" userId="54165c13-dfa2-4054-a27e-170522c03138" providerId="ADAL" clId="{89DF80F2-10DB-4A3A-931B-AAB9A75BF15C}" dt="2023-11-11T17:53:24.650" v="704" actId="1076"/>
+          <ac:grpSpMkLst>
+            <pc:docMk/>
+            <pc:sldMk cId="0" sldId="256"/>
+            <ac:grpSpMk id="22" creationId="{EBB229EC-859E-ED5A-A8D0-F5A1EEBF222E}"/>
+          </ac:grpSpMkLst>
+        </pc:grpChg>
         <pc:grpChg chg="mod">
           <ac:chgData name="OSWALDO EMMANUEL FONSECA URIBE" userId="54165c13-dfa2-4054-a27e-170522c03138" providerId="ADAL" clId="{89DF80F2-10DB-4A3A-931B-AAB9A75BF15C}" dt="2023-11-11T07:50:10.449" v="29" actId="14100"/>
           <ac:grpSpMkLst>
             <pc:docMk/>
             <pc:sldMk cId="0" sldId="256"/>
             <ac:grpSpMk id="25" creationId="{00000000-0000-0000-0000-000000000000}"/>
+          </ac:grpSpMkLst>
+        </pc:grpChg>
+        <pc:grpChg chg="mod">
+          <ac:chgData name="OSWALDO EMMANUEL FONSECA URIBE" userId="54165c13-dfa2-4054-a27e-170522c03138" providerId="ADAL" clId="{89DF80F2-10DB-4A3A-931B-AAB9A75BF15C}" dt="2023-11-11T17:53:14.932" v="701" actId="164"/>
+          <ac:grpSpMkLst>
+            <pc:docMk/>
+            <pc:sldMk cId="0" sldId="256"/>
+            <ac:grpSpMk id="39" creationId="{00000000-0000-0000-0000-000000000000}"/>
+          </ac:grpSpMkLst>
+        </pc:grpChg>
+        <pc:grpChg chg="add mod">
+          <ac:chgData name="OSWALDO EMMANUEL FONSECA URIBE" userId="54165c13-dfa2-4054-a27e-170522c03138" providerId="ADAL" clId="{89DF80F2-10DB-4A3A-931B-AAB9A75BF15C}" dt="2023-11-11T17:53:17.594" v="702" actId="164"/>
+          <ac:grpSpMkLst>
+            <pc:docMk/>
+            <pc:sldMk cId="0" sldId="256"/>
+            <ac:grpSpMk id="44" creationId="{39232014-C603-E075-787B-272390333450}"/>
+          </ac:grpSpMkLst>
+        </pc:grpChg>
+        <pc:grpChg chg="add mod">
+          <ac:chgData name="OSWALDO EMMANUEL FONSECA URIBE" userId="54165c13-dfa2-4054-a27e-170522c03138" providerId="ADAL" clId="{89DF80F2-10DB-4A3A-931B-AAB9A75BF15C}" dt="2023-11-11T17:53:36.358" v="706" actId="14100"/>
+          <ac:grpSpMkLst>
+            <pc:docMk/>
+            <pc:sldMk cId="0" sldId="256"/>
+            <ac:grpSpMk id="46" creationId="{E9E52BCE-A9EF-144D-E6E6-B6BE9CFAC175}"/>
           </ac:grpSpMkLst>
         </pc:grpChg>
         <pc:picChg chg="add mod">
@@ -937,6 +1010,260 @@
             <ac:picMk id="32" creationId="{76C05513-81B3-FD36-300E-4072B09ADED8}"/>
           </ac:picMkLst>
         </pc:picChg>
+      </pc:sldChg>
+      <pc:sldChg chg="addSp delSp modSp add mod">
+        <pc:chgData name="OSWALDO EMMANUEL FONSECA URIBE" userId="54165c13-dfa2-4054-a27e-170522c03138" providerId="ADAL" clId="{89DF80F2-10DB-4A3A-931B-AAB9A75BF15C}" dt="2023-11-11T17:59:59.658" v="1125" actId="1076"/>
+        <pc:sldMkLst>
+          <pc:docMk/>
+          <pc:sldMk cId="838400515" sldId="263"/>
+        </pc:sldMkLst>
+        <pc:spChg chg="add del mod">
+          <ac:chgData name="OSWALDO EMMANUEL FONSECA URIBE" userId="54165c13-dfa2-4054-a27e-170522c03138" providerId="ADAL" clId="{89DF80F2-10DB-4A3A-931B-AAB9A75BF15C}" dt="2023-11-11T17:56:55.148" v="1095" actId="20577"/>
+          <ac:spMkLst>
+            <pc:docMk/>
+            <pc:sldMk cId="838400515" sldId="263"/>
+            <ac:spMk id="15" creationId="{AF319191-6148-4552-BE20-E8E83F5958D4}"/>
+          </ac:spMkLst>
+        </pc:spChg>
+        <pc:spChg chg="mod">
+          <ac:chgData name="OSWALDO EMMANUEL FONSECA URIBE" userId="54165c13-dfa2-4054-a27e-170522c03138" providerId="ADAL" clId="{89DF80F2-10DB-4A3A-931B-AAB9A75BF15C}" dt="2023-11-11T17:55:35.025" v="928"/>
+          <ac:spMkLst>
+            <pc:docMk/>
+            <pc:sldMk cId="838400515" sldId="263"/>
+            <ac:spMk id="32" creationId="{8FDE94CA-8BD5-BF94-EC9B-C0CE9FA0E82B}"/>
+          </ac:spMkLst>
+        </pc:spChg>
+        <pc:spChg chg="mod">
+          <ac:chgData name="OSWALDO EMMANUEL FONSECA URIBE" userId="54165c13-dfa2-4054-a27e-170522c03138" providerId="ADAL" clId="{89DF80F2-10DB-4A3A-931B-AAB9A75BF15C}" dt="2023-11-11T17:55:41.423" v="944" actId="20577"/>
+          <ac:spMkLst>
+            <pc:docMk/>
+            <pc:sldMk cId="838400515" sldId="263"/>
+            <ac:spMk id="35" creationId="{B7B491D6-9A18-ED66-5E19-59D3CC34CF56}"/>
+          </ac:spMkLst>
+        </pc:spChg>
+        <pc:spChg chg="mod">
+          <ac:chgData name="OSWALDO EMMANUEL FONSECA URIBE" userId="54165c13-dfa2-4054-a27e-170522c03138" providerId="ADAL" clId="{89DF80F2-10DB-4A3A-931B-AAB9A75BF15C}" dt="2023-11-11T17:55:35.025" v="928"/>
+          <ac:spMkLst>
+            <pc:docMk/>
+            <pc:sldMk cId="838400515" sldId="263"/>
+            <ac:spMk id="36" creationId="{0BFF68D8-9C21-9CC5-FDAE-187530E1828F}"/>
+          </ac:spMkLst>
+        </pc:spChg>
+        <pc:spChg chg="mod">
+          <ac:chgData name="OSWALDO EMMANUEL FONSECA URIBE" userId="54165c13-dfa2-4054-a27e-170522c03138" providerId="ADAL" clId="{89DF80F2-10DB-4A3A-931B-AAB9A75BF15C}" dt="2023-11-11T17:55:35.025" v="928"/>
+          <ac:spMkLst>
+            <pc:docMk/>
+            <pc:sldMk cId="838400515" sldId="263"/>
+            <ac:spMk id="40" creationId="{4A352A93-F3EB-39A1-4C7C-FB275982E746}"/>
+          </ac:spMkLst>
+        </pc:spChg>
+        <pc:spChg chg="mod">
+          <ac:chgData name="OSWALDO EMMANUEL FONSECA URIBE" userId="54165c13-dfa2-4054-a27e-170522c03138" providerId="ADAL" clId="{89DF80F2-10DB-4A3A-931B-AAB9A75BF15C}" dt="2023-11-11T17:55:56.355" v="952" actId="121"/>
+          <ac:spMkLst>
+            <pc:docMk/>
+            <pc:sldMk cId="838400515" sldId="263"/>
+            <ac:spMk id="42" creationId="{EDDE1964-A6DB-3B52-3CF2-8C8EE206B1BE}"/>
+          </ac:spMkLst>
+        </pc:spChg>
+        <pc:spChg chg="mod">
+          <ac:chgData name="OSWALDO EMMANUEL FONSECA URIBE" userId="54165c13-dfa2-4054-a27e-170522c03138" providerId="ADAL" clId="{89DF80F2-10DB-4A3A-931B-AAB9A75BF15C}" dt="2023-11-11T17:55:56.355" v="952" actId="121"/>
+          <ac:spMkLst>
+            <pc:docMk/>
+            <pc:sldMk cId="838400515" sldId="263"/>
+            <ac:spMk id="43" creationId="{C36E50B6-1364-C0EC-FFF2-78F40CD8A13A}"/>
+          </ac:spMkLst>
+        </pc:spChg>
+        <pc:spChg chg="mod">
+          <ac:chgData name="OSWALDO EMMANUEL FONSECA URIBE" userId="54165c13-dfa2-4054-a27e-170522c03138" providerId="ADAL" clId="{89DF80F2-10DB-4A3A-931B-AAB9A75BF15C}" dt="2023-11-11T17:57:03.480" v="1096"/>
+          <ac:spMkLst>
+            <pc:docMk/>
+            <pc:sldMk cId="838400515" sldId="263"/>
+            <ac:spMk id="45" creationId="{C6892393-07A1-917A-112B-2E88F484B940}"/>
+          </ac:spMkLst>
+        </pc:spChg>
+        <pc:spChg chg="mod">
+          <ac:chgData name="OSWALDO EMMANUEL FONSECA URIBE" userId="54165c13-dfa2-4054-a27e-170522c03138" providerId="ADAL" clId="{89DF80F2-10DB-4A3A-931B-AAB9A75BF15C}" dt="2023-11-11T17:57:10.808" v="1098" actId="1076"/>
+          <ac:spMkLst>
+            <pc:docMk/>
+            <pc:sldMk cId="838400515" sldId="263"/>
+            <ac:spMk id="56" creationId="{326D2AA4-52CE-CD21-EF8C-50151C4E3F40}"/>
+          </ac:spMkLst>
+        </pc:spChg>
+        <pc:spChg chg="mod">
+          <ac:chgData name="OSWALDO EMMANUEL FONSECA URIBE" userId="54165c13-dfa2-4054-a27e-170522c03138" providerId="ADAL" clId="{89DF80F2-10DB-4A3A-931B-AAB9A75BF15C}" dt="2023-11-11T17:57:10.808" v="1098" actId="1076"/>
+          <ac:spMkLst>
+            <pc:docMk/>
+            <pc:sldMk cId="838400515" sldId="263"/>
+            <ac:spMk id="58" creationId="{163DEDEE-0F22-0572-8DAE-4DDCE6C040CD}"/>
+          </ac:spMkLst>
+        </pc:spChg>
+        <pc:spChg chg="mod">
+          <ac:chgData name="OSWALDO EMMANUEL FONSECA URIBE" userId="54165c13-dfa2-4054-a27e-170522c03138" providerId="ADAL" clId="{89DF80F2-10DB-4A3A-931B-AAB9A75BF15C}" dt="2023-11-11T17:59:59.658" v="1125" actId="1076"/>
+          <ac:spMkLst>
+            <pc:docMk/>
+            <pc:sldMk cId="838400515" sldId="263"/>
+            <ac:spMk id="60" creationId="{91620466-8BE9-2456-2F74-D3E088DE996B}"/>
+          </ac:spMkLst>
+        </pc:spChg>
+        <pc:spChg chg="mod">
+          <ac:chgData name="OSWALDO EMMANUEL FONSECA URIBE" userId="54165c13-dfa2-4054-a27e-170522c03138" providerId="ADAL" clId="{89DF80F2-10DB-4A3A-931B-AAB9A75BF15C}" dt="2023-11-11T17:59:59.658" v="1125" actId="1076"/>
+          <ac:spMkLst>
+            <pc:docMk/>
+            <pc:sldMk cId="838400515" sldId="263"/>
+            <ac:spMk id="61" creationId="{AA1B447E-F3B6-F6D4-AF72-511B086BAF08}"/>
+          </ac:spMkLst>
+        </pc:spChg>
+        <pc:spChg chg="add del">
+          <ac:chgData name="OSWALDO EMMANUEL FONSECA URIBE" userId="54165c13-dfa2-4054-a27e-170522c03138" providerId="ADAL" clId="{89DF80F2-10DB-4A3A-931B-AAB9A75BF15C}" dt="2023-11-11T17:58:36.813" v="1106" actId="22"/>
+          <ac:spMkLst>
+            <pc:docMk/>
+            <pc:sldMk cId="838400515" sldId="263"/>
+            <ac:spMk id="63" creationId="{D736079B-ACDF-5DD1-812D-C9ADF11556A2}"/>
+          </ac:spMkLst>
+        </pc:spChg>
+        <pc:spChg chg="add del">
+          <ac:chgData name="OSWALDO EMMANUEL FONSECA URIBE" userId="54165c13-dfa2-4054-a27e-170522c03138" providerId="ADAL" clId="{89DF80F2-10DB-4A3A-931B-AAB9A75BF15C}" dt="2023-11-11T17:58:40.416" v="1108" actId="22"/>
+          <ac:spMkLst>
+            <pc:docMk/>
+            <pc:sldMk cId="838400515" sldId="263"/>
+            <ac:spMk id="65" creationId="{DF5C97E8-73B8-27B3-9020-205C76B1F33F}"/>
+          </ac:spMkLst>
+        </pc:spChg>
+        <pc:spChg chg="add mod">
+          <ac:chgData name="OSWALDO EMMANUEL FONSECA URIBE" userId="54165c13-dfa2-4054-a27e-170522c03138" providerId="ADAL" clId="{89DF80F2-10DB-4A3A-931B-AAB9A75BF15C}" dt="2023-11-11T17:59:59.658" v="1125" actId="1076"/>
+          <ac:spMkLst>
+            <pc:docMk/>
+            <pc:sldMk cId="838400515" sldId="263"/>
+            <ac:spMk id="66" creationId="{E9017C97-3DF3-F6C5-13C4-C62248D23049}"/>
+          </ac:spMkLst>
+        </pc:spChg>
+        <pc:grpChg chg="add mod">
+          <ac:chgData name="OSWALDO EMMANUEL FONSECA URIBE" userId="54165c13-dfa2-4054-a27e-170522c03138" providerId="ADAL" clId="{89DF80F2-10DB-4A3A-931B-AAB9A75BF15C}" dt="2023-11-11T17:57:19.575" v="1100" actId="1076"/>
+          <ac:grpSpMkLst>
+            <pc:docMk/>
+            <pc:sldMk cId="838400515" sldId="263"/>
+            <ac:grpSpMk id="29" creationId="{AF7889B5-C65B-2CAB-3496-6C4483024D4C}"/>
+          </ac:grpSpMkLst>
+        </pc:grpChg>
+        <pc:grpChg chg="mod">
+          <ac:chgData name="OSWALDO EMMANUEL FONSECA URIBE" userId="54165c13-dfa2-4054-a27e-170522c03138" providerId="ADAL" clId="{89DF80F2-10DB-4A3A-931B-AAB9A75BF15C}" dt="2023-11-11T17:55:35.025" v="928"/>
+          <ac:grpSpMkLst>
+            <pc:docMk/>
+            <pc:sldMk cId="838400515" sldId="263"/>
+            <ac:grpSpMk id="30" creationId="{F754504F-8C8C-715B-C7AA-5256F5AAE1AA}"/>
+          </ac:grpSpMkLst>
+        </pc:grpChg>
+        <pc:grpChg chg="mod">
+          <ac:chgData name="OSWALDO EMMANUEL FONSECA URIBE" userId="54165c13-dfa2-4054-a27e-170522c03138" providerId="ADAL" clId="{89DF80F2-10DB-4A3A-931B-AAB9A75BF15C}" dt="2023-11-11T17:55:35.025" v="928"/>
+          <ac:grpSpMkLst>
+            <pc:docMk/>
+            <pc:sldMk cId="838400515" sldId="263"/>
+            <ac:grpSpMk id="31" creationId="{7B37113A-4D71-8FD6-B2B2-9392A4D4F4CB}"/>
+          </ac:grpSpMkLst>
+        </pc:grpChg>
+        <pc:grpChg chg="del">
+          <ac:chgData name="OSWALDO EMMANUEL FONSECA URIBE" userId="54165c13-dfa2-4054-a27e-170522c03138" providerId="ADAL" clId="{89DF80F2-10DB-4A3A-931B-AAB9A75BF15C}" dt="2023-11-11T17:55:34.781" v="927" actId="478"/>
+          <ac:grpSpMkLst>
+            <pc:docMk/>
+            <pc:sldMk cId="838400515" sldId="263"/>
+            <ac:grpSpMk id="34" creationId="{DE4B2B94-C6B1-DAA3-FC2E-49C4B6A657D8}"/>
+          </ac:grpSpMkLst>
+        </pc:grpChg>
+        <pc:grpChg chg="add mod">
+          <ac:chgData name="OSWALDO EMMANUEL FONSECA URIBE" userId="54165c13-dfa2-4054-a27e-170522c03138" providerId="ADAL" clId="{89DF80F2-10DB-4A3A-931B-AAB9A75BF15C}" dt="2023-11-11T17:57:16.788" v="1099" actId="1076"/>
+          <ac:grpSpMkLst>
+            <pc:docMk/>
+            <pc:sldMk cId="838400515" sldId="263"/>
+            <ac:grpSpMk id="41" creationId="{D33EAB15-6406-A295-AFE0-010826D5F084}"/>
+          </ac:grpSpMkLst>
+        </pc:grpChg>
+        <pc:grpChg chg="del mod">
+          <ac:chgData name="OSWALDO EMMANUEL FONSECA URIBE" userId="54165c13-dfa2-4054-a27e-170522c03138" providerId="ADAL" clId="{89DF80F2-10DB-4A3A-931B-AAB9A75BF15C}" dt="2023-11-11T17:56:03.566" v="955" actId="478"/>
+          <ac:grpSpMkLst>
+            <pc:docMk/>
+            <pc:sldMk cId="838400515" sldId="263"/>
+            <ac:grpSpMk id="44" creationId="{64D8B3A0-D465-EA9D-0FE8-1A257EA53D0D}"/>
+          </ac:grpSpMkLst>
+        </pc:grpChg>
+        <pc:grpChg chg="mod">
+          <ac:chgData name="OSWALDO EMMANUEL FONSECA URIBE" userId="54165c13-dfa2-4054-a27e-170522c03138" providerId="ADAL" clId="{89DF80F2-10DB-4A3A-931B-AAB9A75BF15C}" dt="2023-11-11T17:57:03.480" v="1096"/>
+          <ac:grpSpMkLst>
+            <pc:docMk/>
+            <pc:sldMk cId="838400515" sldId="263"/>
+            <ac:grpSpMk id="55" creationId="{B00A3625-84B1-3CF6-C2E8-4665CB0AA2A5}"/>
+          </ac:grpSpMkLst>
+        </pc:grpChg>
+        <pc:grpChg chg="mod">
+          <ac:chgData name="OSWALDO EMMANUEL FONSECA URIBE" userId="54165c13-dfa2-4054-a27e-170522c03138" providerId="ADAL" clId="{89DF80F2-10DB-4A3A-931B-AAB9A75BF15C}" dt="2023-11-11T17:57:03.480" v="1096"/>
+          <ac:grpSpMkLst>
+            <pc:docMk/>
+            <pc:sldMk cId="838400515" sldId="263"/>
+            <ac:grpSpMk id="57" creationId="{39F2F10A-0590-59D0-61DA-C8DF90AF493B}"/>
+          </ac:grpSpMkLst>
+        </pc:grpChg>
+        <pc:grpChg chg="add mod">
+          <ac:chgData name="OSWALDO EMMANUEL FONSECA URIBE" userId="54165c13-dfa2-4054-a27e-170522c03138" providerId="ADAL" clId="{89DF80F2-10DB-4A3A-931B-AAB9A75BF15C}" dt="2023-11-11T17:59:59.658" v="1125" actId="1076"/>
+          <ac:grpSpMkLst>
+            <pc:docMk/>
+            <pc:sldMk cId="838400515" sldId="263"/>
+            <ac:grpSpMk id="59" creationId="{756FF14C-4D14-15F9-1E61-B42E014026FE}"/>
+          </ac:grpSpMkLst>
+        </pc:grpChg>
+        <pc:grpChg chg="add mod">
+          <ac:chgData name="OSWALDO EMMANUEL FONSECA URIBE" userId="54165c13-dfa2-4054-a27e-170522c03138" providerId="ADAL" clId="{89DF80F2-10DB-4A3A-931B-AAB9A75BF15C}" dt="2023-11-11T17:59:59.658" v="1125" actId="1076"/>
+          <ac:grpSpMkLst>
+            <pc:docMk/>
+            <pc:sldMk cId="838400515" sldId="263"/>
+            <ac:grpSpMk id="67" creationId="{AE4CFBC8-CF60-2B0C-0D91-CB2F5C0AECC0}"/>
+          </ac:grpSpMkLst>
+        </pc:grpChg>
+        <pc:picChg chg="add mod">
+          <ac:chgData name="OSWALDO EMMANUEL FONSECA URIBE" userId="54165c13-dfa2-4054-a27e-170522c03138" providerId="ADAL" clId="{89DF80F2-10DB-4A3A-931B-AAB9A75BF15C}" dt="2023-11-11T17:59:59.658" v="1125" actId="1076"/>
+          <ac:picMkLst>
+            <pc:docMk/>
+            <pc:sldMk cId="838400515" sldId="263"/>
+            <ac:picMk id="1026" creationId="{BCA67D02-F185-F856-055C-F31DD6180FA7}"/>
+          </ac:picMkLst>
+        </pc:picChg>
+      </pc:sldChg>
+      <pc:sldChg chg="addSp delSp modSp add del mod">
+        <pc:chgData name="OSWALDO EMMANUEL FONSECA URIBE" userId="54165c13-dfa2-4054-a27e-170522c03138" providerId="ADAL" clId="{89DF80F2-10DB-4A3A-931B-AAB9A75BF15C}" dt="2023-11-11T17:55:20.130" v="925" actId="2696"/>
+        <pc:sldMkLst>
+          <pc:docMk/>
+          <pc:sldMk cId="1112291590" sldId="263"/>
+        </pc:sldMkLst>
+        <pc:spChg chg="mod">
+          <ac:chgData name="OSWALDO EMMANUEL FONSECA URIBE" userId="54165c13-dfa2-4054-a27e-170522c03138" providerId="ADAL" clId="{89DF80F2-10DB-4A3A-931B-AAB9A75BF15C}" dt="2023-11-11T17:52:36.929" v="690" actId="20577"/>
+          <ac:spMkLst>
+            <pc:docMk/>
+            <pc:sldMk cId="1112291590" sldId="263"/>
+            <ac:spMk id="15" creationId="{AF319191-6148-4552-BE20-E8E83F5958D4}"/>
+          </ac:spMkLst>
+        </pc:spChg>
+        <pc:spChg chg="add del mod">
+          <ac:chgData name="OSWALDO EMMANUEL FONSECA URIBE" userId="54165c13-dfa2-4054-a27e-170522c03138" providerId="ADAL" clId="{89DF80F2-10DB-4A3A-931B-AAB9A75BF15C}" dt="2023-11-11T17:55:14.331" v="924" actId="478"/>
+          <ac:spMkLst>
+            <pc:docMk/>
+            <pc:sldMk cId="1112291590" sldId="263"/>
+            <ac:spMk id="29" creationId="{9C1F716B-6F5D-3A67-58D6-4414A8CC27F9}"/>
+          </ac:spMkLst>
+        </pc:spChg>
+        <pc:grpChg chg="mod">
+          <ac:chgData name="OSWALDO EMMANUEL FONSECA URIBE" userId="54165c13-dfa2-4054-a27e-170522c03138" providerId="ADAL" clId="{89DF80F2-10DB-4A3A-931B-AAB9A75BF15C}" dt="2023-11-11T17:52:16.588" v="605" actId="1076"/>
+          <ac:grpSpMkLst>
+            <pc:docMk/>
+            <pc:sldMk cId="1112291590" sldId="263"/>
+            <ac:grpSpMk id="34" creationId="{DE4B2B94-C6B1-DAA3-FC2E-49C4B6A657D8}"/>
+          </ac:grpSpMkLst>
+        </pc:grpChg>
+        <pc:grpChg chg="mod">
+          <ac:chgData name="OSWALDO EMMANUEL FONSECA URIBE" userId="54165c13-dfa2-4054-a27e-170522c03138" providerId="ADAL" clId="{89DF80F2-10DB-4A3A-931B-AAB9A75BF15C}" dt="2023-11-11T17:52:41.012" v="691" actId="1076"/>
+          <ac:grpSpMkLst>
+            <pc:docMk/>
+            <pc:sldMk cId="1112291590" sldId="263"/>
+            <ac:grpSpMk id="44" creationId="{64D8B3A0-D465-EA9D-0FE8-1A257EA53D0D}"/>
+          </ac:grpSpMkLst>
+        </pc:grpChg>
       </pc:sldChg>
     </pc:docChg>
   </pc:docChgLst>
@@ -4670,262 +4997,6 @@
           </a:p>
         </p:txBody>
       </p:sp>
-      <p:grpSp>
-        <p:nvGrpSpPr>
-          <p:cNvPr id="18" name="Group 18"/>
-          <p:cNvGrpSpPr/>
-          <p:nvPr/>
-        </p:nvGrpSpPr>
-        <p:grpSpPr>
-          <a:xfrm>
-            <a:off x="12312234" y="5873816"/>
-            <a:ext cx="2718790" cy="3249688"/>
-            <a:chOff x="0" y="0"/>
-            <a:chExt cx="1482282" cy="1771728"/>
-          </a:xfrm>
-        </p:grpSpPr>
-        <p:sp>
-          <p:nvSpPr>
-            <p:cNvPr id="19" name="Freeform 19"/>
-            <p:cNvSpPr/>
-            <p:nvPr/>
-          </p:nvSpPr>
-          <p:spPr>
-            <a:xfrm>
-              <a:off x="0" y="0"/>
-              <a:ext cx="1482283" cy="1771728"/>
-            </a:xfrm>
-            <a:custGeom>
-              <a:avLst/>
-              <a:gdLst/>
-              <a:ahLst/>
-              <a:cxnLst/>
-              <a:rect l="l" t="t" r="r" b="b"/>
-              <a:pathLst>
-                <a:path w="1482283" h="1771728">
-                  <a:moveTo>
-                    <a:pt x="1357822" y="1771728"/>
-                  </a:moveTo>
-                  <a:lnTo>
-                    <a:pt x="124460" y="1771728"/>
-                  </a:lnTo>
-                  <a:cubicBezTo>
-                    <a:pt x="55880" y="1771728"/>
-                    <a:pt x="0" y="1715848"/>
-                    <a:pt x="0" y="1647268"/>
-                  </a:cubicBezTo>
-                  <a:lnTo>
-                    <a:pt x="0" y="124460"/>
-                  </a:lnTo>
-                  <a:cubicBezTo>
-                    <a:pt x="0" y="55880"/>
-                    <a:pt x="55880" y="0"/>
-                    <a:pt x="124460" y="0"/>
-                  </a:cubicBezTo>
-                  <a:lnTo>
-                    <a:pt x="1357823" y="0"/>
-                  </a:lnTo>
-                  <a:cubicBezTo>
-                    <a:pt x="1426402" y="0"/>
-                    <a:pt x="1482283" y="55880"/>
-                    <a:pt x="1482283" y="124460"/>
-                  </a:cubicBezTo>
-                  <a:lnTo>
-                    <a:pt x="1482283" y="1647268"/>
-                  </a:lnTo>
-                  <a:cubicBezTo>
-                    <a:pt x="1482283" y="1715848"/>
-                    <a:pt x="1426402" y="1771728"/>
-                    <a:pt x="1357823" y="1771728"/>
-                  </a:cubicBezTo>
-                  <a:close/>
-                </a:path>
-              </a:pathLst>
-            </a:custGeom>
-            <a:solidFill>
-              <a:srgbClr val="000000"/>
-            </a:solidFill>
-          </p:spPr>
-          <p:txBody>
-            <a:bodyPr/>
-            <a:lstStyle/>
-            <a:p>
-              <a:endParaRPr lang="es-MX"/>
-            </a:p>
-          </p:txBody>
-        </p:sp>
-      </p:grpSp>
-      <p:grpSp>
-        <p:nvGrpSpPr>
-          <p:cNvPr id="20" name="Group 20"/>
-          <p:cNvGrpSpPr/>
-          <p:nvPr/>
-        </p:nvGrpSpPr>
-        <p:grpSpPr>
-          <a:xfrm>
-            <a:off x="12421697" y="6227168"/>
-            <a:ext cx="2524516" cy="2896337"/>
-            <a:chOff x="0" y="0"/>
-            <a:chExt cx="1215851" cy="1394927"/>
-          </a:xfrm>
-        </p:grpSpPr>
-        <p:sp>
-          <p:nvSpPr>
-            <p:cNvPr id="21" name="Freeform 21"/>
-            <p:cNvSpPr/>
-            <p:nvPr/>
-          </p:nvSpPr>
-          <p:spPr>
-            <a:xfrm>
-              <a:off x="0" y="0"/>
-              <a:ext cx="1215851" cy="1394927"/>
-            </a:xfrm>
-            <a:custGeom>
-              <a:avLst/>
-              <a:gdLst/>
-              <a:ahLst/>
-              <a:cxnLst/>
-              <a:rect l="l" t="t" r="r" b="b"/>
-              <a:pathLst>
-                <a:path w="1215851" h="1394927">
-                  <a:moveTo>
-                    <a:pt x="1091391" y="1394926"/>
-                  </a:moveTo>
-                  <a:lnTo>
-                    <a:pt x="124460" y="1394926"/>
-                  </a:lnTo>
-                  <a:cubicBezTo>
-                    <a:pt x="55880" y="1394926"/>
-                    <a:pt x="0" y="1339047"/>
-                    <a:pt x="0" y="1270466"/>
-                  </a:cubicBezTo>
-                  <a:lnTo>
-                    <a:pt x="0" y="124460"/>
-                  </a:lnTo>
-                  <a:cubicBezTo>
-                    <a:pt x="0" y="55880"/>
-                    <a:pt x="55880" y="0"/>
-                    <a:pt x="124460" y="0"/>
-                  </a:cubicBezTo>
-                  <a:lnTo>
-                    <a:pt x="1091391" y="0"/>
-                  </a:lnTo>
-                  <a:cubicBezTo>
-                    <a:pt x="1159971" y="0"/>
-                    <a:pt x="1215851" y="55880"/>
-                    <a:pt x="1215851" y="124460"/>
-                  </a:cubicBezTo>
-                  <a:lnTo>
-                    <a:pt x="1215851" y="1270467"/>
-                  </a:lnTo>
-                  <a:cubicBezTo>
-                    <a:pt x="1215851" y="1339047"/>
-                    <a:pt x="1159971" y="1394927"/>
-                    <a:pt x="1091391" y="1394927"/>
-                  </a:cubicBezTo>
-                  <a:close/>
-                </a:path>
-              </a:pathLst>
-            </a:custGeom>
-            <a:solidFill>
-              <a:srgbClr val="000000"/>
-            </a:solidFill>
-          </p:spPr>
-          <p:txBody>
-            <a:bodyPr/>
-            <a:lstStyle/>
-            <a:p>
-              <a:endParaRPr lang="es-MX"/>
-            </a:p>
-          </p:txBody>
-        </p:sp>
-      </p:grpSp>
-      <p:sp>
-        <p:nvSpPr>
-          <p:cNvPr id="23" name="Freeform 23"/>
-          <p:cNvSpPr/>
-          <p:nvPr/>
-        </p:nvSpPr>
-        <p:spPr>
-          <a:xfrm>
-            <a:off x="12421697" y="5967474"/>
-            <a:ext cx="2524516" cy="2525021"/>
-          </a:xfrm>
-          <a:custGeom>
-            <a:avLst/>
-            <a:gdLst/>
-            <a:ahLst/>
-            <a:cxnLst/>
-            <a:rect l="l" t="t" r="r" b="b"/>
-            <a:pathLst>
-              <a:path w="6350000" h="6351270">
-                <a:moveTo>
-                  <a:pt x="0" y="5955030"/>
-                </a:moveTo>
-                <a:lnTo>
-                  <a:pt x="0" y="394970"/>
-                </a:lnTo>
-                <a:cubicBezTo>
-                  <a:pt x="0" y="176530"/>
-                  <a:pt x="176530" y="0"/>
-                  <a:pt x="394970" y="0"/>
-                </a:cubicBezTo>
-                <a:lnTo>
-                  <a:pt x="5956300" y="0"/>
-                </a:lnTo>
-                <a:cubicBezTo>
-                  <a:pt x="6173470" y="0"/>
-                  <a:pt x="6350000" y="176530"/>
-                  <a:pt x="6350000" y="394970"/>
-                </a:cubicBezTo>
-                <a:cubicBezTo>
-                  <a:pt x="6350000" y="394970"/>
-                  <a:pt x="6350000" y="394970"/>
-                  <a:pt x="6350000" y="394970"/>
-                </a:cubicBezTo>
-                <a:lnTo>
-                  <a:pt x="6350000" y="5956300"/>
-                </a:lnTo>
-                <a:cubicBezTo>
-                  <a:pt x="6350000" y="6174740"/>
-                  <a:pt x="6173470" y="6351270"/>
-                  <a:pt x="5955030" y="6351270"/>
-                </a:cubicBezTo>
-                <a:lnTo>
-                  <a:pt x="5955030" y="6351270"/>
-                </a:lnTo>
-                <a:lnTo>
-                  <a:pt x="394970" y="6351270"/>
-                </a:lnTo>
-                <a:cubicBezTo>
-                  <a:pt x="176530" y="6350000"/>
-                  <a:pt x="0" y="6173470"/>
-                  <a:pt x="0" y="5955030"/>
-                </a:cubicBezTo>
-                <a:cubicBezTo>
-                  <a:pt x="0" y="5955030"/>
-                  <a:pt x="0" y="5955030"/>
-                  <a:pt x="0" y="5955030"/>
-                </a:cubicBezTo>
-                <a:close/>
-              </a:path>
-            </a:pathLst>
-          </a:custGeom>
-          <a:blipFill>
-            <a:blip r:embed="rId12"/>
-            <a:stretch>
-              <a:fillRect l="-10" r="-10"/>
-            </a:stretch>
-          </a:blipFill>
-        </p:spPr>
-        <p:txBody>
-          <a:bodyPr/>
-          <a:lstStyle/>
-          <a:p>
-            <a:endParaRPr lang="es-MX"/>
-          </a:p>
-        </p:txBody>
-      </p:sp>
       <p:sp>
         <p:nvSpPr>
           <p:cNvPr id="24" name="Freeform 24"/>
@@ -4965,7 +5036,7 @@
             </a:pathLst>
           </a:custGeom>
           <a:blipFill>
-            <a:blip r:embed="rId13"/>
+            <a:blip r:embed="rId12"/>
             <a:stretch>
               <a:fillRect/>
             </a:stretch>
@@ -5094,7 +5165,7 @@
               </a:pathLst>
             </a:custGeom>
             <a:blipFill>
-              <a:blip r:embed="rId14"/>
+              <a:blip r:embed="rId13"/>
               <a:stretch>
                 <a:fillRect/>
               </a:stretch>
@@ -5318,7 +5389,7 @@
               </a:pathLst>
             </a:custGeom>
             <a:blipFill>
-              <a:blip r:embed="rId15"/>
+              <a:blip r:embed="rId14"/>
               <a:stretch>
                 <a:fillRect/>
               </a:stretch>
@@ -5445,7 +5516,7 @@
               </a:pathLst>
             </a:custGeom>
             <a:blipFill>
-              <a:blip r:embed="rId16"/>
+              <a:blip r:embed="rId15"/>
               <a:stretch>
                 <a:fillRect l="-171241" t="-51205" r="-44405" b="-105567"/>
               </a:stretch>
@@ -5460,168 +5531,535 @@
           </p:txBody>
         </p:sp>
       </p:grpSp>
-      <p:sp>
-        <p:nvSpPr>
-          <p:cNvPr id="37" name="TextBox 37"/>
-          <p:cNvSpPr txBox="1"/>
-          <p:nvPr/>
-        </p:nvSpPr>
-        <p:spPr>
-          <a:xfrm>
-            <a:off x="3832617" y="7831004"/>
-            <a:ext cx="5064345" cy="1053877"/>
-          </a:xfrm>
-          <a:prstGeom prst="rect">
-            <a:avLst/>
-          </a:prstGeom>
-        </p:spPr>
-        <p:txBody>
-          <a:bodyPr lIns="0" tIns="0" rIns="0" bIns="0" rtlCol="0" anchor="t">
-            <a:spAutoFit/>
-          </a:bodyPr>
-          <a:lstStyle/>
-          <a:p>
-            <a:pPr>
-              <a:lnSpc>
-                <a:spcPts val="2800"/>
-              </a:lnSpc>
-            </a:pPr>
-            <a:r>
-              <a:rPr lang="en-US" sz="2000">
-                <a:solidFill>
-                  <a:srgbClr val="FCFFFF"/>
-                </a:solidFill>
-                <a:latin typeface="League Spartan Bold"/>
-              </a:rPr>
-              <a:t>By. </a:t>
-            </a:r>
-            <a:r>
-              <a:rPr lang="en-US" sz="2000">
-                <a:solidFill>
-                  <a:srgbClr val="FFFFFF"/>
-                </a:solidFill>
-                <a:latin typeface="League Spartan Bold"/>
-              </a:rPr>
-              <a:t>Oswaldo Emmanuel Fonseca Uribe</a:t>
-            </a:r>
-          </a:p>
-          <a:p>
-            <a:pPr>
-              <a:lnSpc>
-                <a:spcPts val="2800"/>
-              </a:lnSpc>
-            </a:pPr>
-            <a:r>
-              <a:rPr lang="en-US" sz="2000">
-                <a:solidFill>
-                  <a:srgbClr val="FFFFFF"/>
-                </a:solidFill>
-                <a:latin typeface="League Spartan Bold"/>
-              </a:rPr>
-              <a:t>Licenciatura e Ingeniería en Física</a:t>
-            </a:r>
-          </a:p>
-          <a:p>
-            <a:pPr>
-              <a:lnSpc>
-                <a:spcPts val="2800"/>
-              </a:lnSpc>
-            </a:pPr>
-            <a:r>
-              <a:rPr lang="en-US" sz="2000">
-                <a:solidFill>
-                  <a:srgbClr val="FFFFFF"/>
-                </a:solidFill>
-                <a:latin typeface="League Spartan Bold"/>
-              </a:rPr>
-              <a:t>7mo Semestre</a:t>
-            </a:r>
-          </a:p>
-        </p:txBody>
-      </p:sp>
-      <p:sp>
-        <p:nvSpPr>
-          <p:cNvPr id="38" name="Freeform 38"/>
-          <p:cNvSpPr/>
-          <p:nvPr/>
-        </p:nvSpPr>
-        <p:spPr>
-          <a:xfrm rot="1820298">
-            <a:off x="1513973" y="7380136"/>
-            <a:ext cx="2244674" cy="1942663"/>
-          </a:xfrm>
-          <a:custGeom>
-            <a:avLst/>
-            <a:gdLst/>
-            <a:ahLst/>
-            <a:cxnLst/>
-            <a:rect l="l" t="t" r="r" b="b"/>
-            <a:pathLst>
-              <a:path w="2244674" h="1942663">
-                <a:moveTo>
-                  <a:pt x="0" y="0"/>
-                </a:moveTo>
-                <a:lnTo>
-                  <a:pt x="2244675" y="0"/>
-                </a:lnTo>
-                <a:lnTo>
-                  <a:pt x="2244675" y="1942664"/>
-                </a:lnTo>
-                <a:lnTo>
-                  <a:pt x="0" y="1942664"/>
-                </a:lnTo>
-                <a:lnTo>
-                  <a:pt x="0" y="0"/>
-                </a:lnTo>
-                <a:close/>
-              </a:path>
-            </a:pathLst>
-          </a:custGeom>
-          <a:blipFill>
-            <a:blip r:embed="rId17">
-              <a:extLst>
-                <a:ext uri="{96DAC541-7B7A-43D3-8B79-37D633B846F1}">
-                  <asvg:svgBlip xmlns:asvg="http://schemas.microsoft.com/office/drawing/2016/SVG/main" r:embed="rId18"/>
-                </a:ext>
-              </a:extLst>
-            </a:blip>
-            <a:stretch>
-              <a:fillRect/>
-            </a:stretch>
-          </a:blipFill>
-        </p:spPr>
-        <p:txBody>
-          <a:bodyPr/>
-          <a:lstStyle/>
-          <a:p>
-            <a:endParaRPr lang="es-MX"/>
-          </a:p>
-        </p:txBody>
-      </p:sp>
       <p:grpSp>
         <p:nvGrpSpPr>
-          <p:cNvPr id="39" name="Group 39"/>
+          <p:cNvPr id="46" name="Grupo 45">
+            <a:extLst>
+              <a:ext uri="{FF2B5EF4-FFF2-40B4-BE49-F238E27FC236}">
+                <a16:creationId xmlns:a16="http://schemas.microsoft.com/office/drawing/2014/main" id="{E9E52BCE-A9EF-144D-E6E6-B6BE9CFAC175}"/>
+              </a:ext>
+            </a:extLst>
+          </p:cNvPr>
           <p:cNvGrpSpPr/>
           <p:nvPr/>
         </p:nvGrpSpPr>
         <p:grpSpPr>
           <a:xfrm>
-            <a:off x="1780035" y="7355074"/>
-            <a:ext cx="1712552" cy="1992788"/>
-            <a:chOff x="0" y="0"/>
-            <a:chExt cx="698500" cy="812800"/>
+            <a:off x="2064633" y="6388538"/>
+            <a:ext cx="10835235" cy="2709355"/>
+            <a:chOff x="1513973" y="7355074"/>
+            <a:chExt cx="7969545" cy="1992788"/>
           </a:xfrm>
         </p:grpSpPr>
         <p:sp>
           <p:nvSpPr>
-            <p:cNvPr id="40" name="Freeform 40"/>
+            <p:cNvPr id="37" name="TextBox 37"/>
+            <p:cNvSpPr txBox="1"/>
+            <p:nvPr/>
+          </p:nvSpPr>
+          <p:spPr>
+            <a:xfrm>
+              <a:off x="3832617" y="7855352"/>
+              <a:ext cx="5650901" cy="815945"/>
+            </a:xfrm>
+            <a:prstGeom prst="rect">
+              <a:avLst/>
+            </a:prstGeom>
+          </p:spPr>
+          <p:txBody>
+            <a:bodyPr wrap="square" lIns="0" tIns="0" rIns="0" bIns="0" rtlCol="0" anchor="t">
+              <a:spAutoFit/>
+            </a:bodyPr>
+            <a:lstStyle/>
+            <a:p>
+              <a:pPr>
+                <a:lnSpc>
+                  <a:spcPts val="2800"/>
+                </a:lnSpc>
+              </a:pPr>
+              <a:r>
+                <a:rPr lang="en-US" sz="3600" b="1" dirty="0">
+                  <a:solidFill>
+                    <a:srgbClr val="FCFFFF"/>
+                  </a:solidFill>
+                  <a:latin typeface="League Spartan Bold"/>
+                </a:rPr>
+                <a:t>By. </a:t>
+              </a:r>
+              <a:r>
+                <a:rPr lang="en-US" sz="3600" b="1" dirty="0">
+                  <a:solidFill>
+                    <a:srgbClr val="FFFFFF"/>
+                  </a:solidFill>
+                  <a:latin typeface="League Spartan Bold"/>
+                </a:rPr>
+                <a:t>Oswaldo Emmanuel Fonseca Uribe</a:t>
+              </a:r>
+            </a:p>
+            <a:p>
+              <a:pPr>
+                <a:lnSpc>
+                  <a:spcPts val="2800"/>
+                </a:lnSpc>
+              </a:pPr>
+              <a:r>
+                <a:rPr lang="en-US" sz="3600" b="1" dirty="0" err="1">
+                  <a:solidFill>
+                    <a:srgbClr val="FFFFFF"/>
+                  </a:solidFill>
+                  <a:latin typeface="League Spartan Bold"/>
+                </a:rPr>
+                <a:t>Licenciatura</a:t>
+              </a:r>
+              <a:r>
+                <a:rPr lang="en-US" sz="3600" b="1" dirty="0">
+                  <a:solidFill>
+                    <a:srgbClr val="FFFFFF"/>
+                  </a:solidFill>
+                  <a:latin typeface="League Spartan Bold"/>
+                </a:rPr>
+                <a:t> e </a:t>
+              </a:r>
+              <a:r>
+                <a:rPr lang="en-US" sz="3600" b="1" dirty="0" err="1">
+                  <a:solidFill>
+                    <a:srgbClr val="FFFFFF"/>
+                  </a:solidFill>
+                  <a:latin typeface="League Spartan Bold"/>
+                </a:rPr>
+                <a:t>Ingeniería</a:t>
+              </a:r>
+              <a:r>
+                <a:rPr lang="en-US" sz="3600" b="1" dirty="0">
+                  <a:solidFill>
+                    <a:srgbClr val="FFFFFF"/>
+                  </a:solidFill>
+                  <a:latin typeface="League Spartan Bold"/>
+                </a:rPr>
+                <a:t> </a:t>
+              </a:r>
+              <a:r>
+                <a:rPr lang="en-US" sz="3600" b="1" dirty="0" err="1">
+                  <a:solidFill>
+                    <a:srgbClr val="FFFFFF"/>
+                  </a:solidFill>
+                  <a:latin typeface="League Spartan Bold"/>
+                </a:rPr>
+                <a:t>en</a:t>
+              </a:r>
+              <a:r>
+                <a:rPr lang="en-US" sz="3600" b="1" dirty="0">
+                  <a:solidFill>
+                    <a:srgbClr val="FFFFFF"/>
+                  </a:solidFill>
+                  <a:latin typeface="League Spartan Bold"/>
+                </a:rPr>
+                <a:t> </a:t>
+              </a:r>
+              <a:r>
+                <a:rPr lang="en-US" sz="3600" b="1" dirty="0" err="1">
+                  <a:solidFill>
+                    <a:srgbClr val="FFFFFF"/>
+                  </a:solidFill>
+                  <a:latin typeface="League Spartan Bold"/>
+                </a:rPr>
+                <a:t>Física</a:t>
+              </a:r>
+              <a:endParaRPr lang="en-US" sz="3600" b="1" dirty="0">
+                <a:solidFill>
+                  <a:srgbClr val="FFFFFF"/>
+                </a:solidFill>
+                <a:latin typeface="League Spartan Bold"/>
+              </a:endParaRPr>
+            </a:p>
+            <a:p>
+              <a:pPr>
+                <a:lnSpc>
+                  <a:spcPts val="2800"/>
+                </a:lnSpc>
+              </a:pPr>
+              <a:r>
+                <a:rPr lang="en-US" sz="3600" b="1" dirty="0">
+                  <a:solidFill>
+                    <a:srgbClr val="FFFFFF"/>
+                  </a:solidFill>
+                  <a:latin typeface="League Spartan Bold"/>
+                </a:rPr>
+                <a:t>7mo </a:t>
+              </a:r>
+              <a:r>
+                <a:rPr lang="en-US" sz="3600" b="1" dirty="0" err="1">
+                  <a:solidFill>
+                    <a:srgbClr val="FFFFFF"/>
+                  </a:solidFill>
+                  <a:latin typeface="League Spartan Bold"/>
+                </a:rPr>
+                <a:t>Semestre</a:t>
+              </a:r>
+              <a:endParaRPr lang="en-US" sz="3600" b="1" dirty="0">
+                <a:solidFill>
+                  <a:srgbClr val="FFFFFF"/>
+                </a:solidFill>
+                <a:latin typeface="League Spartan Bold"/>
+              </a:endParaRPr>
+            </a:p>
+          </p:txBody>
+        </p:sp>
+        <p:grpSp>
+          <p:nvGrpSpPr>
+            <p:cNvPr id="44" name="Grupo 43">
+              <a:extLst>
+                <a:ext uri="{FF2B5EF4-FFF2-40B4-BE49-F238E27FC236}">
+                  <a16:creationId xmlns:a16="http://schemas.microsoft.com/office/drawing/2014/main" id="{39232014-C603-E075-787B-272390333450}"/>
+                </a:ext>
+              </a:extLst>
+            </p:cNvPr>
+            <p:cNvGrpSpPr/>
+            <p:nvPr/>
+          </p:nvGrpSpPr>
+          <p:grpSpPr>
+            <a:xfrm>
+              <a:off x="1513973" y="7355074"/>
+              <a:ext cx="2244674" cy="1992788"/>
+              <a:chOff x="1513973" y="7355074"/>
+              <a:chExt cx="2244674" cy="1992788"/>
+            </a:xfrm>
+          </p:grpSpPr>
+          <p:sp>
+            <p:nvSpPr>
+              <p:cNvPr id="38" name="Freeform 38"/>
+              <p:cNvSpPr/>
+              <p:nvPr/>
+            </p:nvSpPr>
+            <p:spPr>
+              <a:xfrm rot="1820298">
+                <a:off x="1513973" y="7380136"/>
+                <a:ext cx="2244674" cy="1942663"/>
+              </a:xfrm>
+              <a:custGeom>
+                <a:avLst/>
+                <a:gdLst/>
+                <a:ahLst/>
+                <a:cxnLst/>
+                <a:rect l="l" t="t" r="r" b="b"/>
+                <a:pathLst>
+                  <a:path w="2244674" h="1942663">
+                    <a:moveTo>
+                      <a:pt x="0" y="0"/>
+                    </a:moveTo>
+                    <a:lnTo>
+                      <a:pt x="2244675" y="0"/>
+                    </a:lnTo>
+                    <a:lnTo>
+                      <a:pt x="2244675" y="1942664"/>
+                    </a:lnTo>
+                    <a:lnTo>
+                      <a:pt x="0" y="1942664"/>
+                    </a:lnTo>
+                    <a:lnTo>
+                      <a:pt x="0" y="0"/>
+                    </a:lnTo>
+                    <a:close/>
+                  </a:path>
+                </a:pathLst>
+              </a:custGeom>
+              <a:blipFill>
+                <a:blip r:embed="rId16">
+                  <a:extLst>
+                    <a:ext uri="{96DAC541-7B7A-43D3-8B79-37D633B846F1}">
+                      <asvg:svgBlip xmlns:asvg="http://schemas.microsoft.com/office/drawing/2016/SVG/main" r:embed="rId17"/>
+                    </a:ext>
+                  </a:extLst>
+                </a:blip>
+                <a:stretch>
+                  <a:fillRect/>
+                </a:stretch>
+              </a:blipFill>
+            </p:spPr>
+            <p:txBody>
+              <a:bodyPr/>
+              <a:lstStyle/>
+              <a:p>
+                <a:endParaRPr lang="es-MX"/>
+              </a:p>
+            </p:txBody>
+          </p:sp>
+          <p:grpSp>
+            <p:nvGrpSpPr>
+              <p:cNvPr id="39" name="Group 39"/>
+              <p:cNvGrpSpPr/>
+              <p:nvPr/>
+            </p:nvGrpSpPr>
+            <p:grpSpPr>
+              <a:xfrm>
+                <a:off x="1780035" y="7355074"/>
+                <a:ext cx="1712552" cy="1992788"/>
+                <a:chOff x="0" y="0"/>
+                <a:chExt cx="698500" cy="812800"/>
+              </a:xfrm>
+            </p:grpSpPr>
+            <p:sp>
+              <p:nvSpPr>
+                <p:cNvPr id="40" name="Freeform 40"/>
+                <p:cNvSpPr/>
+                <p:nvPr/>
+              </p:nvSpPr>
+              <p:spPr>
+                <a:xfrm>
+                  <a:off x="0" y="0"/>
+                  <a:ext cx="698500" cy="812800"/>
+                </a:xfrm>
+                <a:custGeom>
+                  <a:avLst/>
+                  <a:gdLst/>
+                  <a:ahLst/>
+                  <a:cxnLst/>
+                  <a:rect l="l" t="t" r="r" b="b"/>
+                  <a:pathLst>
+                    <a:path w="698500" h="812800">
+                      <a:moveTo>
+                        <a:pt x="349250" y="0"/>
+                      </a:moveTo>
+                      <a:lnTo>
+                        <a:pt x="698500" y="203200"/>
+                      </a:lnTo>
+                      <a:lnTo>
+                        <a:pt x="698500" y="609600"/>
+                      </a:lnTo>
+                      <a:lnTo>
+                        <a:pt x="349250" y="812800"/>
+                      </a:lnTo>
+                      <a:lnTo>
+                        <a:pt x="0" y="609600"/>
+                      </a:lnTo>
+                      <a:lnTo>
+                        <a:pt x="0" y="203200"/>
+                      </a:lnTo>
+                      <a:lnTo>
+                        <a:pt x="349250" y="0"/>
+                      </a:lnTo>
+                      <a:close/>
+                    </a:path>
+                  </a:pathLst>
+                </a:custGeom>
+                <a:blipFill>
+                  <a:blip r:embed="rId18"/>
+                  <a:stretch>
+                    <a:fillRect l="-116442" t="-73005" r="-63385" b="-67471"/>
+                  </a:stretch>
+                </a:blipFill>
+              </p:spPr>
+              <p:txBody>
+                <a:bodyPr/>
+                <a:lstStyle/>
+                <a:p>
+                  <a:endParaRPr lang="es-MX"/>
+                </a:p>
+              </p:txBody>
+            </p:sp>
+          </p:grpSp>
+        </p:grpSp>
+      </p:grpSp>
+      <p:grpSp>
+        <p:nvGrpSpPr>
+          <p:cNvPr id="22" name="Grupo 21">
+            <a:extLst>
+              <a:ext uri="{FF2B5EF4-FFF2-40B4-BE49-F238E27FC236}">
+                <a16:creationId xmlns:a16="http://schemas.microsoft.com/office/drawing/2014/main" id="{EBB229EC-859E-ED5A-A8D0-F5A1EEBF222E}"/>
+              </a:ext>
+            </a:extLst>
+          </p:cNvPr>
+          <p:cNvGrpSpPr/>
+          <p:nvPr/>
+        </p:nvGrpSpPr>
+        <p:grpSpPr>
+          <a:xfrm>
+            <a:off x="13583396" y="5206663"/>
+            <a:ext cx="3384966" cy="4045949"/>
+            <a:chOff x="12312234" y="5873816"/>
+            <a:chExt cx="2718790" cy="3249689"/>
+          </a:xfrm>
+        </p:grpSpPr>
+        <p:grpSp>
+          <p:nvGrpSpPr>
+            <p:cNvPr id="18" name="Group 18"/>
+            <p:cNvGrpSpPr/>
+            <p:nvPr/>
+          </p:nvGrpSpPr>
+          <p:grpSpPr>
+            <a:xfrm>
+              <a:off x="12312234" y="5873816"/>
+              <a:ext cx="2718790" cy="3249688"/>
+              <a:chOff x="0" y="0"/>
+              <a:chExt cx="1482282" cy="1771728"/>
+            </a:xfrm>
+          </p:grpSpPr>
+          <p:sp>
+            <p:nvSpPr>
+              <p:cNvPr id="19" name="Freeform 19"/>
+              <p:cNvSpPr/>
+              <p:nvPr/>
+            </p:nvSpPr>
+            <p:spPr>
+              <a:xfrm>
+                <a:off x="0" y="0"/>
+                <a:ext cx="1482283" cy="1771728"/>
+              </a:xfrm>
+              <a:custGeom>
+                <a:avLst/>
+                <a:gdLst/>
+                <a:ahLst/>
+                <a:cxnLst/>
+                <a:rect l="l" t="t" r="r" b="b"/>
+                <a:pathLst>
+                  <a:path w="1482283" h="1771728">
+                    <a:moveTo>
+                      <a:pt x="1357822" y="1771728"/>
+                    </a:moveTo>
+                    <a:lnTo>
+                      <a:pt x="124460" y="1771728"/>
+                    </a:lnTo>
+                    <a:cubicBezTo>
+                      <a:pt x="55880" y="1771728"/>
+                      <a:pt x="0" y="1715848"/>
+                      <a:pt x="0" y="1647268"/>
+                    </a:cubicBezTo>
+                    <a:lnTo>
+                      <a:pt x="0" y="124460"/>
+                    </a:lnTo>
+                    <a:cubicBezTo>
+                      <a:pt x="0" y="55880"/>
+                      <a:pt x="55880" y="0"/>
+                      <a:pt x="124460" y="0"/>
+                    </a:cubicBezTo>
+                    <a:lnTo>
+                      <a:pt x="1357823" y="0"/>
+                    </a:lnTo>
+                    <a:cubicBezTo>
+                      <a:pt x="1426402" y="0"/>
+                      <a:pt x="1482283" y="55880"/>
+                      <a:pt x="1482283" y="124460"/>
+                    </a:cubicBezTo>
+                    <a:lnTo>
+                      <a:pt x="1482283" y="1647268"/>
+                    </a:lnTo>
+                    <a:cubicBezTo>
+                      <a:pt x="1482283" y="1715848"/>
+                      <a:pt x="1426402" y="1771728"/>
+                      <a:pt x="1357823" y="1771728"/>
+                    </a:cubicBezTo>
+                    <a:close/>
+                  </a:path>
+                </a:pathLst>
+              </a:custGeom>
+              <a:solidFill>
+                <a:srgbClr val="000000"/>
+              </a:solidFill>
+            </p:spPr>
+            <p:txBody>
+              <a:bodyPr/>
+              <a:lstStyle/>
+              <a:p>
+                <a:endParaRPr lang="es-MX"/>
+              </a:p>
+            </p:txBody>
+          </p:sp>
+        </p:grpSp>
+        <p:grpSp>
+          <p:nvGrpSpPr>
+            <p:cNvPr id="20" name="Group 20"/>
+            <p:cNvGrpSpPr/>
+            <p:nvPr/>
+          </p:nvGrpSpPr>
+          <p:grpSpPr>
+            <a:xfrm>
+              <a:off x="12421697" y="6227168"/>
+              <a:ext cx="2524516" cy="2896337"/>
+              <a:chOff x="0" y="0"/>
+              <a:chExt cx="1215851" cy="1394927"/>
+            </a:xfrm>
+          </p:grpSpPr>
+          <p:sp>
+            <p:nvSpPr>
+              <p:cNvPr id="21" name="Freeform 21"/>
+              <p:cNvSpPr/>
+              <p:nvPr/>
+            </p:nvSpPr>
+            <p:spPr>
+              <a:xfrm>
+                <a:off x="0" y="0"/>
+                <a:ext cx="1215851" cy="1394927"/>
+              </a:xfrm>
+              <a:custGeom>
+                <a:avLst/>
+                <a:gdLst/>
+                <a:ahLst/>
+                <a:cxnLst/>
+                <a:rect l="l" t="t" r="r" b="b"/>
+                <a:pathLst>
+                  <a:path w="1215851" h="1394927">
+                    <a:moveTo>
+                      <a:pt x="1091391" y="1394926"/>
+                    </a:moveTo>
+                    <a:lnTo>
+                      <a:pt x="124460" y="1394926"/>
+                    </a:lnTo>
+                    <a:cubicBezTo>
+                      <a:pt x="55880" y="1394926"/>
+                      <a:pt x="0" y="1339047"/>
+                      <a:pt x="0" y="1270466"/>
+                    </a:cubicBezTo>
+                    <a:lnTo>
+                      <a:pt x="0" y="124460"/>
+                    </a:lnTo>
+                    <a:cubicBezTo>
+                      <a:pt x="0" y="55880"/>
+                      <a:pt x="55880" y="0"/>
+                      <a:pt x="124460" y="0"/>
+                    </a:cubicBezTo>
+                    <a:lnTo>
+                      <a:pt x="1091391" y="0"/>
+                    </a:lnTo>
+                    <a:cubicBezTo>
+                      <a:pt x="1159971" y="0"/>
+                      <a:pt x="1215851" y="55880"/>
+                      <a:pt x="1215851" y="124460"/>
+                    </a:cubicBezTo>
+                    <a:lnTo>
+                      <a:pt x="1215851" y="1270467"/>
+                    </a:lnTo>
+                    <a:cubicBezTo>
+                      <a:pt x="1215851" y="1339047"/>
+                      <a:pt x="1159971" y="1394927"/>
+                      <a:pt x="1091391" y="1394927"/>
+                    </a:cubicBezTo>
+                    <a:close/>
+                  </a:path>
+                </a:pathLst>
+              </a:custGeom>
+              <a:solidFill>
+                <a:srgbClr val="000000"/>
+              </a:solidFill>
+            </p:spPr>
+            <p:txBody>
+              <a:bodyPr/>
+              <a:lstStyle/>
+              <a:p>
+                <a:endParaRPr lang="es-MX"/>
+              </a:p>
+            </p:txBody>
+          </p:sp>
+        </p:grpSp>
+        <p:sp>
+          <p:nvSpPr>
+            <p:cNvPr id="23" name="Freeform 23"/>
             <p:cNvSpPr/>
             <p:nvPr/>
           </p:nvSpPr>
           <p:spPr>
             <a:xfrm>
-              <a:off x="0" y="0"/>
-              <a:ext cx="698500" cy="812800"/>
+              <a:off x="12421697" y="5967474"/>
+              <a:ext cx="2524516" cy="2525021"/>
             </a:xfrm>
             <a:custGeom>
               <a:avLst/>
@@ -5630,28 +6068,55 @@
               <a:cxnLst/>
               <a:rect l="l" t="t" r="r" b="b"/>
               <a:pathLst>
-                <a:path w="698500" h="812800">
+                <a:path w="6350000" h="6351270">
                   <a:moveTo>
-                    <a:pt x="349250" y="0"/>
+                    <a:pt x="0" y="5955030"/>
                   </a:moveTo>
                   <a:lnTo>
-                    <a:pt x="698500" y="203200"/>
-                  </a:lnTo>
-                  <a:lnTo>
-                    <a:pt x="698500" y="609600"/>
-                  </a:lnTo>
-                  <a:lnTo>
-                    <a:pt x="349250" y="812800"/>
-                  </a:lnTo>
-                  <a:lnTo>
-                    <a:pt x="0" y="609600"/>
-                  </a:lnTo>
-                  <a:lnTo>
-                    <a:pt x="0" y="203200"/>
-                  </a:lnTo>
-                  <a:lnTo>
-                    <a:pt x="349250" y="0"/>
-                  </a:lnTo>
+                    <a:pt x="0" y="394970"/>
+                  </a:lnTo>
+                  <a:cubicBezTo>
+                    <a:pt x="0" y="176530"/>
+                    <a:pt x="176530" y="0"/>
+                    <a:pt x="394970" y="0"/>
+                  </a:cubicBezTo>
+                  <a:lnTo>
+                    <a:pt x="5956300" y="0"/>
+                  </a:lnTo>
+                  <a:cubicBezTo>
+                    <a:pt x="6173470" y="0"/>
+                    <a:pt x="6350000" y="176530"/>
+                    <a:pt x="6350000" y="394970"/>
+                  </a:cubicBezTo>
+                  <a:cubicBezTo>
+                    <a:pt x="6350000" y="394970"/>
+                    <a:pt x="6350000" y="394970"/>
+                    <a:pt x="6350000" y="394970"/>
+                  </a:cubicBezTo>
+                  <a:lnTo>
+                    <a:pt x="6350000" y="5956300"/>
+                  </a:lnTo>
+                  <a:cubicBezTo>
+                    <a:pt x="6350000" y="6174740"/>
+                    <a:pt x="6173470" y="6351270"/>
+                    <a:pt x="5955030" y="6351270"/>
+                  </a:cubicBezTo>
+                  <a:lnTo>
+                    <a:pt x="5955030" y="6351270"/>
+                  </a:lnTo>
+                  <a:lnTo>
+                    <a:pt x="394970" y="6351270"/>
+                  </a:lnTo>
+                  <a:cubicBezTo>
+                    <a:pt x="176530" y="6350000"/>
+                    <a:pt x="0" y="6173470"/>
+                    <a:pt x="0" y="5955030"/>
+                  </a:cubicBezTo>
+                  <a:cubicBezTo>
+                    <a:pt x="0" y="5955030"/>
+                    <a:pt x="0" y="5955030"/>
+                    <a:pt x="0" y="5955030"/>
+                  </a:cubicBezTo>
                   <a:close/>
                 </a:path>
               </a:pathLst>
@@ -5659,7 +6124,7 @@
             <a:blipFill>
               <a:blip r:embed="rId19"/>
               <a:stretch>
-                <a:fillRect l="-116442" t="-73005" r="-63385" b="-67471"/>
+                <a:fillRect l="-10" r="-10"/>
               </a:stretch>
             </a:blipFill>
           </p:spPr>
@@ -5671,69 +6136,69 @@
             </a:p>
           </p:txBody>
         </p:sp>
-      </p:grpSp>
-      <p:sp>
-        <p:nvSpPr>
-          <p:cNvPr id="41" name="TextBox 41"/>
-          <p:cNvSpPr txBox="1"/>
-          <p:nvPr/>
-        </p:nvSpPr>
-        <p:spPr>
-          <a:xfrm>
-            <a:off x="12421697" y="8539232"/>
-            <a:ext cx="2524516" cy="422238"/>
-          </a:xfrm>
-          <a:prstGeom prst="rect">
-            <a:avLst/>
-          </a:prstGeom>
-        </p:spPr>
-        <p:txBody>
-          <a:bodyPr lIns="0" tIns="0" rIns="0" bIns="0" rtlCol="0" anchor="t">
-            <a:spAutoFit/>
-          </a:bodyPr>
-          <a:lstStyle/>
-          <a:p>
-            <a:pPr algn="ctr">
-              <a:lnSpc>
-                <a:spcPts val="3499"/>
-              </a:lnSpc>
-            </a:pPr>
-            <a:r>
-              <a:rPr lang="en-US" sz="2499" dirty="0" err="1">
+        <p:sp>
+          <p:nvSpPr>
+            <p:cNvPr id="41" name="TextBox 41"/>
+            <p:cNvSpPr txBox="1"/>
+            <p:nvPr/>
+          </p:nvSpPr>
+          <p:spPr>
+            <a:xfrm>
+              <a:off x="12421697" y="8539232"/>
+              <a:ext cx="2524516" cy="422238"/>
+            </a:xfrm>
+            <a:prstGeom prst="rect">
+              <a:avLst/>
+            </a:prstGeom>
+          </p:spPr>
+          <p:txBody>
+            <a:bodyPr lIns="0" tIns="0" rIns="0" bIns="0" rtlCol="0" anchor="t">
+              <a:spAutoFit/>
+            </a:bodyPr>
+            <a:lstStyle/>
+            <a:p>
+              <a:pPr algn="ctr">
+                <a:lnSpc>
+                  <a:spcPts val="3499"/>
+                </a:lnSpc>
+              </a:pPr>
+              <a:r>
+                <a:rPr lang="en-US" sz="2499" dirty="0" err="1">
+                  <a:solidFill>
+                    <a:srgbClr val="FFFFFF"/>
+                  </a:solidFill>
+                  <a:latin typeface="League Spartan Bold"/>
+                </a:rPr>
+                <a:t>Hablame</a:t>
+              </a:r>
+              <a:r>
+                <a:rPr lang="en-US" sz="2499" dirty="0">
+                  <a:solidFill>
+                    <a:srgbClr val="FFFFFF"/>
+                  </a:solidFill>
+                  <a:latin typeface="League Spartan Bold"/>
+                </a:rPr>
+                <a:t> de </a:t>
+              </a:r>
+              <a:r>
+                <a:rPr lang="en-US" sz="2499" dirty="0" err="1">
+                  <a:solidFill>
+                    <a:srgbClr val="FFFFFF"/>
+                  </a:solidFill>
+                  <a:latin typeface="League Spartan Bold"/>
+                </a:rPr>
+                <a:t>ti</a:t>
+              </a:r>
+              <a:endParaRPr lang="en-US" sz="2499" dirty="0">
                 <a:solidFill>
                   <a:srgbClr val="FFFFFF"/>
                 </a:solidFill>
                 <a:latin typeface="League Spartan Bold"/>
-              </a:rPr>
-              <a:t>Hablame</a:t>
-            </a:r>
-            <a:r>
-              <a:rPr lang="en-US" sz="2499" dirty="0">
-                <a:solidFill>
-                  <a:srgbClr val="FFFFFF"/>
-                </a:solidFill>
-                <a:latin typeface="League Spartan Bold"/>
-              </a:rPr>
-              <a:t> de </a:t>
-            </a:r>
-            <a:r>
-              <a:rPr lang="en-US" sz="2499" dirty="0" err="1">
-                <a:solidFill>
-                  <a:srgbClr val="FFFFFF"/>
-                </a:solidFill>
-                <a:latin typeface="League Spartan Bold"/>
-              </a:rPr>
-              <a:t>ti</a:t>
-            </a:r>
-            <a:endParaRPr lang="en-US" sz="2499" dirty="0">
-              <a:solidFill>
-                <a:srgbClr val="FFFFFF"/>
-              </a:solidFill>
-              <a:latin typeface="League Spartan Bold"/>
-            </a:endParaRPr>
-          </a:p>
-        </p:txBody>
-      </p:sp>
+              </a:endParaRPr>
+            </a:p>
+          </p:txBody>
+        </p:sp>
+      </p:grpSp>
       <p:sp>
         <p:nvSpPr>
           <p:cNvPr id="42" name="TextBox 42"/>
@@ -5977,11 +6442,11 @@
   <p:clrMapOvr>
     <a:masterClrMapping/>
   </p:clrMapOvr>
-  <mc:AlternateContent xmlns:mc="http://schemas.openxmlformats.org/markup-compatibility/2006">
-    <mc:Choice xmlns:p14="http://schemas.microsoft.com/office/powerpoint/2010/main" Requires="p14">
+  <mc:AlternateContent xmlns:mc="http://schemas.openxmlformats.org/markup-compatibility/2006" xmlns:p14="http://schemas.microsoft.com/office/powerpoint/2010/main">
+    <mc:Choice Requires="p14">
       <p:transition p14:dur="10"/>
     </mc:Choice>
-    <mc:Fallback>
+    <mc:Fallback xmlns="">
       <p:transition/>
     </mc:Fallback>
   </mc:AlternateContent>
@@ -8264,13 +8729,13 @@
   <p:clrMapOvr>
     <a:masterClrMapping/>
   </p:clrMapOvr>
-  <mc:AlternateContent xmlns:mc="http://schemas.openxmlformats.org/markup-compatibility/2006">
-    <mc:Choice xmlns:p159="http://schemas.microsoft.com/office/powerpoint/2015/09/main" Requires="p159">
+  <mc:AlternateContent xmlns:mc="http://schemas.openxmlformats.org/markup-compatibility/2006" xmlns:p159="http://schemas.microsoft.com/office/powerpoint/2015/09/main">
+    <mc:Choice Requires="p159">
       <p:transition xmlns:p14="http://schemas.microsoft.com/office/powerpoint/2010/main" spd="slow" p14:dur="2000">
         <p159:morph option="byObject"/>
       </p:transition>
     </mc:Choice>
-    <mc:Fallback>
+    <mc:Fallback xmlns="">
       <p:transition spd="slow">
         <p:fade/>
       </p:transition>
@@ -10068,13 +10533,13 @@
   <p:clrMapOvr>
     <a:masterClrMapping/>
   </p:clrMapOvr>
-  <mc:AlternateContent xmlns:mc="http://schemas.openxmlformats.org/markup-compatibility/2006">
-    <mc:Choice xmlns:p159="http://schemas.microsoft.com/office/powerpoint/2015/09/main" Requires="p159">
+  <mc:AlternateContent xmlns:mc="http://schemas.openxmlformats.org/markup-compatibility/2006" xmlns:p159="http://schemas.microsoft.com/office/powerpoint/2015/09/main">
+    <mc:Choice Requires="p159">
       <p:transition xmlns:p14="http://schemas.microsoft.com/office/powerpoint/2010/main" spd="slow" p14:dur="2000">
         <p159:morph option="byObject"/>
       </p:transition>
     </mc:Choice>
-    <mc:Fallback>
+    <mc:Fallback xmlns="">
       <p:transition spd="slow">
         <p:fade/>
       </p:transition>
@@ -11990,13 +12455,13 @@
   <p:clrMapOvr>
     <a:masterClrMapping/>
   </p:clrMapOvr>
-  <mc:AlternateContent xmlns:mc="http://schemas.openxmlformats.org/markup-compatibility/2006">
-    <mc:Choice xmlns:p159="http://schemas.microsoft.com/office/powerpoint/2015/09/main" Requires="p159">
+  <mc:AlternateContent xmlns:mc="http://schemas.openxmlformats.org/markup-compatibility/2006" xmlns:p159="http://schemas.microsoft.com/office/powerpoint/2015/09/main">
+    <mc:Choice Requires="p159">
       <p:transition xmlns:p14="http://schemas.microsoft.com/office/powerpoint/2010/main" spd="slow" p14:dur="2000">
         <p159:morph option="byObject"/>
       </p:transition>
     </mc:Choice>
-    <mc:Fallback>
+    <mc:Fallback xmlns="">
       <p:transition spd="slow">
         <p:fade/>
       </p:transition>
@@ -13857,13 +14322,13 @@
   <p:clrMapOvr>
     <a:masterClrMapping/>
   </p:clrMapOvr>
-  <mc:AlternateContent xmlns:mc="http://schemas.openxmlformats.org/markup-compatibility/2006">
-    <mc:Choice xmlns:p159="http://schemas.microsoft.com/office/powerpoint/2015/09/main" Requires="p159">
+  <mc:AlternateContent xmlns:mc="http://schemas.openxmlformats.org/markup-compatibility/2006" xmlns:p159="http://schemas.microsoft.com/office/powerpoint/2015/09/main">
+    <mc:Choice Requires="p159">
       <p:transition xmlns:p14="http://schemas.microsoft.com/office/powerpoint/2010/main" spd="slow" p14:dur="2000">
         <p159:morph option="byObject"/>
       </p:transition>
     </mc:Choice>
-    <mc:Fallback>
+    <mc:Fallback xmlns="">
       <p:transition spd="slow">
         <p:fade/>
       </p:transition>
@@ -16134,6 +16599,2712 @@
   <p:clrMapOvr>
     <a:masterClrMapping/>
   </p:clrMapOvr>
+  <mc:AlternateContent xmlns:mc="http://schemas.openxmlformats.org/markup-compatibility/2006" xmlns:p159="http://schemas.microsoft.com/office/powerpoint/2015/09/main">
+    <mc:Choice Requires="p159">
+      <p:transition xmlns:p14="http://schemas.microsoft.com/office/powerpoint/2010/main" spd="slow" p14:dur="2000">
+        <p159:morph option="byObject"/>
+      </p:transition>
+    </mc:Choice>
+    <mc:Fallback xmlns="">
+      <p:transition spd="slow">
+        <p:fade/>
+      </p:transition>
+    </mc:Fallback>
+  </mc:AlternateContent>
+</p:sld>
+</file>
+
+<file path=ppt/slides/slide7.xml><?xml version="1.0" encoding="utf-8"?>
+<p:sld xmlns:a="http://schemas.openxmlformats.org/drawingml/2006/main" xmlns:r="http://schemas.openxmlformats.org/officeDocument/2006/relationships" xmlns:p="http://schemas.openxmlformats.org/presentationml/2006/main">
+  <p:cSld>
+    <p:bg>
+      <p:bgPr>
+        <a:solidFill>
+          <a:srgbClr val="E9C46A"/>
+        </a:solidFill>
+        <a:effectLst/>
+      </p:bgPr>
+    </p:bg>
+    <p:spTree>
+      <p:nvGrpSpPr>
+        <p:cNvPr id="1" name=""/>
+        <p:cNvGrpSpPr/>
+        <p:nvPr/>
+      </p:nvGrpSpPr>
+      <p:grpSpPr>
+        <a:xfrm>
+          <a:off x="0" y="0"/>
+          <a:ext cx="0" cy="0"/>
+          <a:chOff x="0" y="0"/>
+          <a:chExt cx="0" cy="0"/>
+        </a:xfrm>
+      </p:grpSpPr>
+      <p:grpSp>
+        <p:nvGrpSpPr>
+          <p:cNvPr id="2" name="Group 2"/>
+          <p:cNvGrpSpPr/>
+          <p:nvPr/>
+        </p:nvGrpSpPr>
+        <p:grpSpPr>
+          <a:xfrm>
+            <a:off x="-2842" y="-1"/>
+            <a:ext cx="18290842" cy="1232521"/>
+            <a:chOff x="0" y="0"/>
+            <a:chExt cx="11204418" cy="794049"/>
+          </a:xfrm>
+        </p:grpSpPr>
+        <p:sp>
+          <p:nvSpPr>
+            <p:cNvPr id="3" name="Freeform 3"/>
+            <p:cNvSpPr/>
+            <p:nvPr/>
+          </p:nvSpPr>
+          <p:spPr>
+            <a:xfrm>
+              <a:off x="0" y="0"/>
+              <a:ext cx="11204418" cy="794049"/>
+            </a:xfrm>
+            <a:custGeom>
+              <a:avLst/>
+              <a:gdLst/>
+              <a:ahLst/>
+              <a:cxnLst/>
+              <a:rect l="l" t="t" r="r" b="b"/>
+              <a:pathLst>
+                <a:path w="11204418" h="794049">
+                  <a:moveTo>
+                    <a:pt x="0" y="0"/>
+                  </a:moveTo>
+                  <a:lnTo>
+                    <a:pt x="11204418" y="0"/>
+                  </a:lnTo>
+                  <a:lnTo>
+                    <a:pt x="11204418" y="794049"/>
+                  </a:lnTo>
+                  <a:lnTo>
+                    <a:pt x="0" y="794049"/>
+                  </a:lnTo>
+                  <a:close/>
+                </a:path>
+              </a:pathLst>
+            </a:custGeom>
+            <a:solidFill>
+              <a:srgbClr val="FFFFFF"/>
+            </a:solidFill>
+          </p:spPr>
+          <p:txBody>
+            <a:bodyPr/>
+            <a:lstStyle/>
+            <a:p>
+              <a:endParaRPr lang="es-MX"/>
+            </a:p>
+          </p:txBody>
+        </p:sp>
+      </p:grpSp>
+      <p:sp>
+        <p:nvSpPr>
+          <p:cNvPr id="4" name="Freeform 4"/>
+          <p:cNvSpPr/>
+          <p:nvPr/>
+        </p:nvSpPr>
+        <p:spPr>
+          <a:xfrm>
+            <a:off x="1320038" y="63678"/>
+            <a:ext cx="1258296" cy="1097825"/>
+          </a:xfrm>
+          <a:custGeom>
+            <a:avLst/>
+            <a:gdLst/>
+            <a:ahLst/>
+            <a:cxnLst/>
+            <a:rect l="l" t="t" r="r" b="b"/>
+            <a:pathLst>
+              <a:path w="1258296" h="1097825">
+                <a:moveTo>
+                  <a:pt x="0" y="0"/>
+                </a:moveTo>
+                <a:lnTo>
+                  <a:pt x="1258296" y="0"/>
+                </a:lnTo>
+                <a:lnTo>
+                  <a:pt x="1258296" y="1097825"/>
+                </a:lnTo>
+                <a:lnTo>
+                  <a:pt x="0" y="1097825"/>
+                </a:lnTo>
+                <a:lnTo>
+                  <a:pt x="0" y="0"/>
+                </a:lnTo>
+                <a:close/>
+              </a:path>
+            </a:pathLst>
+          </a:custGeom>
+          <a:blipFill>
+            <a:blip r:embed="rId2"/>
+            <a:stretch>
+              <a:fillRect t="-130790" r="-214338" b="-129495"/>
+            </a:stretch>
+          </a:blipFill>
+        </p:spPr>
+        <p:txBody>
+          <a:bodyPr/>
+          <a:lstStyle/>
+          <a:p>
+            <a:endParaRPr lang="es-MX"/>
+          </a:p>
+        </p:txBody>
+      </p:sp>
+      <p:sp>
+        <p:nvSpPr>
+          <p:cNvPr id="5" name="Freeform 5"/>
+          <p:cNvSpPr/>
+          <p:nvPr/>
+        </p:nvSpPr>
+        <p:spPr>
+          <a:xfrm rot="1563487">
+            <a:off x="-1075504" y="-715812"/>
+            <a:ext cx="2450480" cy="1696350"/>
+          </a:xfrm>
+          <a:custGeom>
+            <a:avLst/>
+            <a:gdLst/>
+            <a:ahLst/>
+            <a:cxnLst/>
+            <a:rect l="l" t="t" r="r" b="b"/>
+            <a:pathLst>
+              <a:path w="2450480" h="1696350">
+                <a:moveTo>
+                  <a:pt x="0" y="0"/>
+                </a:moveTo>
+                <a:lnTo>
+                  <a:pt x="2450480" y="0"/>
+                </a:lnTo>
+                <a:lnTo>
+                  <a:pt x="2450480" y="1696349"/>
+                </a:lnTo>
+                <a:lnTo>
+                  <a:pt x="0" y="1696349"/>
+                </a:lnTo>
+                <a:lnTo>
+                  <a:pt x="0" y="0"/>
+                </a:lnTo>
+                <a:close/>
+              </a:path>
+            </a:pathLst>
+          </a:custGeom>
+          <a:blipFill>
+            <a:blip r:embed="rId3">
+              <a:extLst>
+                <a:ext uri="{96DAC541-7B7A-43D3-8B79-37D633B846F1}">
+                  <asvg:svgBlip xmlns:asvg="http://schemas.microsoft.com/office/drawing/2016/SVG/main" r:embed="rId4"/>
+                </a:ext>
+              </a:extLst>
+            </a:blip>
+            <a:stretch>
+              <a:fillRect/>
+            </a:stretch>
+          </a:blipFill>
+        </p:spPr>
+        <p:txBody>
+          <a:bodyPr/>
+          <a:lstStyle/>
+          <a:p>
+            <a:endParaRPr lang="es-MX"/>
+          </a:p>
+        </p:txBody>
+      </p:sp>
+      <p:sp>
+        <p:nvSpPr>
+          <p:cNvPr id="6" name="Freeform 6"/>
+          <p:cNvSpPr/>
+          <p:nvPr/>
+        </p:nvSpPr>
+        <p:spPr>
+          <a:xfrm rot="-5400000">
+            <a:off x="16717349" y="-911912"/>
+            <a:ext cx="2450480" cy="1696350"/>
+          </a:xfrm>
+          <a:custGeom>
+            <a:avLst/>
+            <a:gdLst/>
+            <a:ahLst/>
+            <a:cxnLst/>
+            <a:rect l="l" t="t" r="r" b="b"/>
+            <a:pathLst>
+              <a:path w="2450480" h="1696350">
+                <a:moveTo>
+                  <a:pt x="0" y="0"/>
+                </a:moveTo>
+                <a:lnTo>
+                  <a:pt x="2450480" y="0"/>
+                </a:lnTo>
+                <a:lnTo>
+                  <a:pt x="2450480" y="1696350"/>
+                </a:lnTo>
+                <a:lnTo>
+                  <a:pt x="0" y="1696350"/>
+                </a:lnTo>
+                <a:lnTo>
+                  <a:pt x="0" y="0"/>
+                </a:lnTo>
+                <a:close/>
+              </a:path>
+            </a:pathLst>
+          </a:custGeom>
+          <a:blipFill>
+            <a:blip r:embed="rId3">
+              <a:extLst>
+                <a:ext uri="{96DAC541-7B7A-43D3-8B79-37D633B846F1}">
+                  <asvg:svgBlip xmlns:asvg="http://schemas.microsoft.com/office/drawing/2016/SVG/main" r:embed="rId4"/>
+                </a:ext>
+              </a:extLst>
+            </a:blip>
+            <a:stretch>
+              <a:fillRect/>
+            </a:stretch>
+          </a:blipFill>
+        </p:spPr>
+        <p:txBody>
+          <a:bodyPr/>
+          <a:lstStyle/>
+          <a:p>
+            <a:endParaRPr lang="es-MX"/>
+          </a:p>
+        </p:txBody>
+      </p:sp>
+      <p:sp>
+        <p:nvSpPr>
+          <p:cNvPr id="7" name="Freeform 7"/>
+          <p:cNvSpPr/>
+          <p:nvPr/>
+        </p:nvSpPr>
+        <p:spPr>
+          <a:xfrm>
+            <a:off x="13093685" y="63899"/>
+            <a:ext cx="3874677" cy="1097825"/>
+          </a:xfrm>
+          <a:custGeom>
+            <a:avLst/>
+            <a:gdLst/>
+            <a:ahLst/>
+            <a:cxnLst/>
+            <a:rect l="l" t="t" r="r" b="b"/>
+            <a:pathLst>
+              <a:path w="3874677" h="1097825">
+                <a:moveTo>
+                  <a:pt x="0" y="0"/>
+                </a:moveTo>
+                <a:lnTo>
+                  <a:pt x="3874677" y="0"/>
+                </a:lnTo>
+                <a:lnTo>
+                  <a:pt x="3874677" y="1097825"/>
+                </a:lnTo>
+                <a:lnTo>
+                  <a:pt x="0" y="1097825"/>
+                </a:lnTo>
+                <a:lnTo>
+                  <a:pt x="0" y="0"/>
+                </a:lnTo>
+                <a:close/>
+              </a:path>
+            </a:pathLst>
+          </a:custGeom>
+          <a:blipFill>
+            <a:blip r:embed="rId5"/>
+            <a:stretch>
+              <a:fillRect/>
+            </a:stretch>
+          </a:blipFill>
+        </p:spPr>
+        <p:txBody>
+          <a:bodyPr/>
+          <a:lstStyle/>
+          <a:p>
+            <a:endParaRPr lang="es-MX"/>
+          </a:p>
+        </p:txBody>
+      </p:sp>
+      <p:grpSp>
+        <p:nvGrpSpPr>
+          <p:cNvPr id="8" name="Group 8"/>
+          <p:cNvGrpSpPr/>
+          <p:nvPr/>
+        </p:nvGrpSpPr>
+        <p:grpSpPr>
+          <a:xfrm>
+            <a:off x="0" y="9638871"/>
+            <a:ext cx="18290842" cy="648129"/>
+            <a:chOff x="0" y="0"/>
+            <a:chExt cx="11204418" cy="794049"/>
+          </a:xfrm>
+        </p:grpSpPr>
+        <p:sp>
+          <p:nvSpPr>
+            <p:cNvPr id="9" name="Freeform 9"/>
+            <p:cNvSpPr/>
+            <p:nvPr/>
+          </p:nvSpPr>
+          <p:spPr>
+            <a:xfrm>
+              <a:off x="0" y="0"/>
+              <a:ext cx="11204418" cy="794049"/>
+            </a:xfrm>
+            <a:custGeom>
+              <a:avLst/>
+              <a:gdLst/>
+              <a:ahLst/>
+              <a:cxnLst/>
+              <a:rect l="l" t="t" r="r" b="b"/>
+              <a:pathLst>
+                <a:path w="11204418" h="794049">
+                  <a:moveTo>
+                    <a:pt x="0" y="0"/>
+                  </a:moveTo>
+                  <a:lnTo>
+                    <a:pt x="11204418" y="0"/>
+                  </a:lnTo>
+                  <a:lnTo>
+                    <a:pt x="11204418" y="794049"/>
+                  </a:lnTo>
+                  <a:lnTo>
+                    <a:pt x="0" y="794049"/>
+                  </a:lnTo>
+                  <a:close/>
+                </a:path>
+              </a:pathLst>
+            </a:custGeom>
+            <a:solidFill>
+              <a:srgbClr val="FFFFFF"/>
+            </a:solidFill>
+          </p:spPr>
+          <p:txBody>
+            <a:bodyPr/>
+            <a:lstStyle/>
+            <a:p>
+              <a:endParaRPr lang="es-MX"/>
+            </a:p>
+          </p:txBody>
+        </p:sp>
+      </p:grpSp>
+      <p:grpSp>
+        <p:nvGrpSpPr>
+          <p:cNvPr id="10" name="Group 10"/>
+          <p:cNvGrpSpPr/>
+          <p:nvPr/>
+        </p:nvGrpSpPr>
+        <p:grpSpPr>
+          <a:xfrm>
+            <a:off x="56335" y="9717415"/>
+            <a:ext cx="1735820" cy="515473"/>
+            <a:chOff x="0" y="0"/>
+            <a:chExt cx="2314426" cy="687297"/>
+          </a:xfrm>
+        </p:grpSpPr>
+        <p:sp>
+          <p:nvSpPr>
+            <p:cNvPr id="11" name="Freeform 11"/>
+            <p:cNvSpPr/>
+            <p:nvPr/>
+          </p:nvSpPr>
+          <p:spPr>
+            <a:xfrm>
+              <a:off x="0" y="0"/>
+              <a:ext cx="698472" cy="687297"/>
+            </a:xfrm>
+            <a:custGeom>
+              <a:avLst/>
+              <a:gdLst/>
+              <a:ahLst/>
+              <a:cxnLst/>
+              <a:rect l="l" t="t" r="r" b="b"/>
+              <a:pathLst>
+                <a:path w="698472" h="687297">
+                  <a:moveTo>
+                    <a:pt x="0" y="0"/>
+                  </a:moveTo>
+                  <a:lnTo>
+                    <a:pt x="698472" y="0"/>
+                  </a:lnTo>
+                  <a:lnTo>
+                    <a:pt x="698472" y="687297"/>
+                  </a:lnTo>
+                  <a:lnTo>
+                    <a:pt x="0" y="687297"/>
+                  </a:lnTo>
+                  <a:lnTo>
+                    <a:pt x="0" y="0"/>
+                  </a:lnTo>
+                  <a:close/>
+                </a:path>
+              </a:pathLst>
+            </a:custGeom>
+            <a:blipFill>
+              <a:blip r:embed="rId6"/>
+              <a:stretch>
+                <a:fillRect/>
+              </a:stretch>
+            </a:blipFill>
+          </p:spPr>
+          <p:txBody>
+            <a:bodyPr/>
+            <a:lstStyle/>
+            <a:p>
+              <a:endParaRPr lang="es-MX" dirty="0"/>
+            </a:p>
+          </p:txBody>
+        </p:sp>
+        <p:sp>
+          <p:nvSpPr>
+            <p:cNvPr id="12" name="TextBox 12"/>
+            <p:cNvSpPr txBox="1"/>
+            <p:nvPr/>
+          </p:nvSpPr>
+          <p:spPr>
+            <a:xfrm>
+              <a:off x="797632" y="50409"/>
+              <a:ext cx="1516794" cy="598593"/>
+            </a:xfrm>
+            <a:prstGeom prst="rect">
+              <a:avLst/>
+            </a:prstGeom>
+          </p:spPr>
+          <p:txBody>
+            <a:bodyPr lIns="0" tIns="0" rIns="0" bIns="0" rtlCol="0" anchor="t">
+              <a:spAutoFit/>
+            </a:bodyPr>
+            <a:lstStyle/>
+            <a:p>
+              <a:pPr algn="ctr">
+                <a:lnSpc>
+                  <a:spcPts val="1839"/>
+                </a:lnSpc>
+              </a:pPr>
+              <a:r>
+                <a:rPr lang="en-US" sz="1314" dirty="0" err="1">
+                  <a:solidFill>
+                    <a:srgbClr val="000000"/>
+                  </a:solidFill>
+                  <a:latin typeface="League Spartan Bold"/>
+                </a:rPr>
+                <a:t>Patrocinado</a:t>
+              </a:r>
+              <a:r>
+                <a:rPr lang="en-US" sz="1314" dirty="0">
+                  <a:solidFill>
+                    <a:srgbClr val="000000"/>
+                  </a:solidFill>
+                  <a:latin typeface="League Spartan Bold"/>
+                </a:rPr>
+                <a:t> </a:t>
+              </a:r>
+              <a:r>
+                <a:rPr lang="en-US" sz="1314" dirty="0" err="1">
+                  <a:solidFill>
+                    <a:srgbClr val="000000"/>
+                  </a:solidFill>
+                  <a:latin typeface="League Spartan Bold"/>
+                </a:rPr>
+                <a:t>por</a:t>
+              </a:r>
+              <a:r>
+                <a:rPr lang="en-US" sz="1314" dirty="0">
+                  <a:solidFill>
+                    <a:srgbClr val="000000"/>
+                  </a:solidFill>
+                  <a:latin typeface="League Spartan Bold"/>
+                </a:rPr>
+                <a:t> GitHub</a:t>
+              </a:r>
+            </a:p>
+          </p:txBody>
+        </p:sp>
+      </p:grpSp>
+      <p:sp>
+        <p:nvSpPr>
+          <p:cNvPr id="13" name="Freeform 13"/>
+          <p:cNvSpPr/>
+          <p:nvPr/>
+        </p:nvSpPr>
+        <p:spPr>
+          <a:xfrm>
+            <a:off x="9621020" y="9717415"/>
+            <a:ext cx="2585200" cy="1789610"/>
+          </a:xfrm>
+          <a:custGeom>
+            <a:avLst/>
+            <a:gdLst/>
+            <a:ahLst/>
+            <a:cxnLst/>
+            <a:rect l="l" t="t" r="r" b="b"/>
+            <a:pathLst>
+              <a:path w="2585200" h="1789610">
+                <a:moveTo>
+                  <a:pt x="0" y="0"/>
+                </a:moveTo>
+                <a:lnTo>
+                  <a:pt x="2585199" y="0"/>
+                </a:lnTo>
+                <a:lnTo>
+                  <a:pt x="2585199" y="1789610"/>
+                </a:lnTo>
+                <a:lnTo>
+                  <a:pt x="0" y="1789610"/>
+                </a:lnTo>
+                <a:lnTo>
+                  <a:pt x="0" y="0"/>
+                </a:lnTo>
+                <a:close/>
+              </a:path>
+            </a:pathLst>
+          </a:custGeom>
+          <a:blipFill>
+            <a:blip r:embed="rId3">
+              <a:extLst>
+                <a:ext uri="{96DAC541-7B7A-43D3-8B79-37D633B846F1}">
+                  <asvg:svgBlip xmlns:asvg="http://schemas.microsoft.com/office/drawing/2016/SVG/main" r:embed="rId4"/>
+                </a:ext>
+              </a:extLst>
+            </a:blip>
+            <a:stretch>
+              <a:fillRect/>
+            </a:stretch>
+          </a:blipFill>
+        </p:spPr>
+        <p:txBody>
+          <a:bodyPr/>
+          <a:lstStyle/>
+          <a:p>
+            <a:endParaRPr lang="es-MX"/>
+          </a:p>
+        </p:txBody>
+      </p:sp>
+      <p:sp>
+        <p:nvSpPr>
+          <p:cNvPr id="14" name="TextBox 14"/>
+          <p:cNvSpPr txBox="1"/>
+          <p:nvPr/>
+        </p:nvSpPr>
+        <p:spPr>
+          <a:xfrm>
+            <a:off x="2716119" y="101674"/>
+            <a:ext cx="3561643" cy="927026"/>
+          </a:xfrm>
+          <a:prstGeom prst="rect">
+            <a:avLst/>
+          </a:prstGeom>
+        </p:spPr>
+        <p:txBody>
+          <a:bodyPr lIns="0" tIns="0" rIns="0" bIns="0" rtlCol="0" anchor="t">
+            <a:spAutoFit/>
+          </a:bodyPr>
+          <a:lstStyle/>
+          <a:p>
+            <a:pPr algn="ctr">
+              <a:lnSpc>
+                <a:spcPts val="7699"/>
+              </a:lnSpc>
+              <a:spcBef>
+                <a:spcPct val="0"/>
+              </a:spcBef>
+            </a:pPr>
+            <a:r>
+              <a:rPr lang="en-US" sz="5499">
+                <a:solidFill>
+                  <a:srgbClr val="000000"/>
+                </a:solidFill>
+                <a:latin typeface="League Spartan Bold"/>
+              </a:rPr>
+              <a:t>Bee</a:t>
+            </a:r>
+            <a:r>
+              <a:rPr lang="en-US" sz="5499">
+                <a:solidFill>
+                  <a:srgbClr val="FBC644"/>
+                </a:solidFill>
+                <a:latin typeface="League Spartan Bold"/>
+              </a:rPr>
+              <a:t>Py</a:t>
+            </a:r>
+            <a:r>
+              <a:rPr lang="en-US" sz="5499">
+                <a:solidFill>
+                  <a:srgbClr val="000000"/>
+                </a:solidFill>
+                <a:latin typeface="League Spartan Bold"/>
+              </a:rPr>
+              <a:t> 3</a:t>
+            </a:r>
+            <a:r>
+              <a:rPr lang="en-US" sz="5499">
+                <a:solidFill>
+                  <a:srgbClr val="FBC644"/>
+                </a:solidFill>
+                <a:latin typeface="League Spartan Bold"/>
+              </a:rPr>
+              <a:t>.</a:t>
+            </a:r>
+            <a:r>
+              <a:rPr lang="en-US" sz="5499">
+                <a:solidFill>
+                  <a:srgbClr val="000000"/>
+                </a:solidFill>
+                <a:latin typeface="League Spartan Bold"/>
+              </a:rPr>
+              <a:t>5</a:t>
+            </a:r>
+          </a:p>
+        </p:txBody>
+      </p:sp>
+      <p:grpSp>
+        <p:nvGrpSpPr>
+          <p:cNvPr id="48" name="Group 48"/>
+          <p:cNvGrpSpPr>
+            <a:grpSpLocks noChangeAspect="1"/>
+          </p:cNvGrpSpPr>
+          <p:nvPr/>
+        </p:nvGrpSpPr>
+        <p:grpSpPr>
+          <a:xfrm>
+            <a:off x="18790764" y="12111304"/>
+            <a:ext cx="3865586" cy="3722400"/>
+            <a:chOff x="0" y="0"/>
+            <a:chExt cx="3290600" cy="3168712"/>
+          </a:xfrm>
+        </p:grpSpPr>
+        <p:sp>
+          <p:nvSpPr>
+            <p:cNvPr id="49" name="Freeform 49"/>
+            <p:cNvSpPr/>
+            <p:nvPr/>
+          </p:nvSpPr>
+          <p:spPr>
+            <a:xfrm rot="1820298">
+              <a:off x="379882" y="489195"/>
+              <a:ext cx="2530835" cy="2190322"/>
+            </a:xfrm>
+            <a:custGeom>
+              <a:avLst/>
+              <a:gdLst/>
+              <a:ahLst/>
+              <a:cxnLst/>
+              <a:rect l="l" t="t" r="r" b="b"/>
+              <a:pathLst>
+                <a:path w="2530835" h="2190322">
+                  <a:moveTo>
+                    <a:pt x="0" y="0"/>
+                  </a:moveTo>
+                  <a:lnTo>
+                    <a:pt x="2530835" y="0"/>
+                  </a:lnTo>
+                  <a:lnTo>
+                    <a:pt x="2530835" y="2190322"/>
+                  </a:lnTo>
+                  <a:lnTo>
+                    <a:pt x="0" y="2190322"/>
+                  </a:lnTo>
+                  <a:lnTo>
+                    <a:pt x="0" y="0"/>
+                  </a:lnTo>
+                  <a:close/>
+                </a:path>
+              </a:pathLst>
+            </a:custGeom>
+            <a:blipFill>
+              <a:blip r:embed="rId7">
+                <a:extLst>
+                  <a:ext uri="{96DAC541-7B7A-43D3-8B79-37D633B846F1}">
+                    <asvg:svgBlip xmlns:asvg="http://schemas.microsoft.com/office/drawing/2016/SVG/main" r:embed="rId8"/>
+                  </a:ext>
+                </a:extLst>
+              </a:blip>
+              <a:stretch>
+                <a:fillRect/>
+              </a:stretch>
+            </a:blipFill>
+          </p:spPr>
+          <p:txBody>
+            <a:bodyPr/>
+            <a:lstStyle/>
+            <a:p>
+              <a:endParaRPr lang="es-MX"/>
+            </a:p>
+          </p:txBody>
+        </p:sp>
+        <p:sp>
+          <p:nvSpPr>
+            <p:cNvPr id="50" name="Freeform 50"/>
+            <p:cNvSpPr/>
+            <p:nvPr/>
+          </p:nvSpPr>
+          <p:spPr>
+            <a:xfrm>
+              <a:off x="671171" y="929254"/>
+              <a:ext cx="1948258" cy="1310204"/>
+            </a:xfrm>
+            <a:custGeom>
+              <a:avLst/>
+              <a:gdLst/>
+              <a:ahLst/>
+              <a:cxnLst/>
+              <a:rect l="l" t="t" r="r" b="b"/>
+              <a:pathLst>
+                <a:path w="1948258" h="1310204">
+                  <a:moveTo>
+                    <a:pt x="0" y="0"/>
+                  </a:moveTo>
+                  <a:lnTo>
+                    <a:pt x="1948258" y="0"/>
+                  </a:lnTo>
+                  <a:lnTo>
+                    <a:pt x="1948258" y="1310204"/>
+                  </a:lnTo>
+                  <a:lnTo>
+                    <a:pt x="0" y="1310204"/>
+                  </a:lnTo>
+                  <a:lnTo>
+                    <a:pt x="0" y="0"/>
+                  </a:lnTo>
+                  <a:close/>
+                </a:path>
+              </a:pathLst>
+            </a:custGeom>
+            <a:blipFill>
+              <a:blip r:embed="rId9"/>
+              <a:stretch>
+                <a:fillRect/>
+              </a:stretch>
+            </a:blipFill>
+          </p:spPr>
+          <p:txBody>
+            <a:bodyPr/>
+            <a:lstStyle/>
+            <a:p>
+              <a:endParaRPr lang="es-MX"/>
+            </a:p>
+          </p:txBody>
+        </p:sp>
+      </p:grpSp>
+      <p:grpSp>
+        <p:nvGrpSpPr>
+          <p:cNvPr id="51" name="Group 51"/>
+          <p:cNvGrpSpPr>
+            <a:grpSpLocks noChangeAspect="1"/>
+          </p:cNvGrpSpPr>
+          <p:nvPr/>
+        </p:nvGrpSpPr>
+        <p:grpSpPr>
+          <a:xfrm>
+            <a:off x="10118529" y="13741207"/>
+            <a:ext cx="3865586" cy="3722400"/>
+            <a:chOff x="0" y="0"/>
+            <a:chExt cx="3290600" cy="3168712"/>
+          </a:xfrm>
+        </p:grpSpPr>
+        <p:sp>
+          <p:nvSpPr>
+            <p:cNvPr id="52" name="Freeform 52"/>
+            <p:cNvSpPr/>
+            <p:nvPr/>
+          </p:nvSpPr>
+          <p:spPr>
+            <a:xfrm rot="1820298">
+              <a:off x="379882" y="489195"/>
+              <a:ext cx="2530835" cy="2190322"/>
+            </a:xfrm>
+            <a:custGeom>
+              <a:avLst/>
+              <a:gdLst/>
+              <a:ahLst/>
+              <a:cxnLst/>
+              <a:rect l="l" t="t" r="r" b="b"/>
+              <a:pathLst>
+                <a:path w="2530835" h="2190322">
+                  <a:moveTo>
+                    <a:pt x="0" y="0"/>
+                  </a:moveTo>
+                  <a:lnTo>
+                    <a:pt x="2530835" y="0"/>
+                  </a:lnTo>
+                  <a:lnTo>
+                    <a:pt x="2530835" y="2190322"/>
+                  </a:lnTo>
+                  <a:lnTo>
+                    <a:pt x="0" y="2190322"/>
+                  </a:lnTo>
+                  <a:lnTo>
+                    <a:pt x="0" y="0"/>
+                  </a:lnTo>
+                  <a:close/>
+                </a:path>
+              </a:pathLst>
+            </a:custGeom>
+            <a:blipFill>
+              <a:blip r:embed="rId7">
+                <a:extLst>
+                  <a:ext uri="{96DAC541-7B7A-43D3-8B79-37D633B846F1}">
+                    <asvg:svgBlip xmlns:asvg="http://schemas.microsoft.com/office/drawing/2016/SVG/main" r:embed="rId8"/>
+                  </a:ext>
+                </a:extLst>
+              </a:blip>
+              <a:stretch>
+                <a:fillRect/>
+              </a:stretch>
+            </a:blipFill>
+          </p:spPr>
+          <p:txBody>
+            <a:bodyPr/>
+            <a:lstStyle/>
+            <a:p>
+              <a:endParaRPr lang="es-MX"/>
+            </a:p>
+          </p:txBody>
+        </p:sp>
+        <p:sp>
+          <p:nvSpPr>
+            <p:cNvPr id="53" name="Freeform 53"/>
+            <p:cNvSpPr/>
+            <p:nvPr/>
+          </p:nvSpPr>
+          <p:spPr>
+            <a:xfrm>
+              <a:off x="889347" y="655077"/>
+              <a:ext cx="1511906" cy="1858558"/>
+            </a:xfrm>
+            <a:custGeom>
+              <a:avLst/>
+              <a:gdLst/>
+              <a:ahLst/>
+              <a:cxnLst/>
+              <a:rect l="l" t="t" r="r" b="b"/>
+              <a:pathLst>
+                <a:path w="1511906" h="1858558">
+                  <a:moveTo>
+                    <a:pt x="0" y="0"/>
+                  </a:moveTo>
+                  <a:lnTo>
+                    <a:pt x="1511906" y="0"/>
+                  </a:lnTo>
+                  <a:lnTo>
+                    <a:pt x="1511906" y="1858558"/>
+                  </a:lnTo>
+                  <a:lnTo>
+                    <a:pt x="0" y="1858558"/>
+                  </a:lnTo>
+                  <a:lnTo>
+                    <a:pt x="0" y="0"/>
+                  </a:lnTo>
+                  <a:close/>
+                </a:path>
+              </a:pathLst>
+            </a:custGeom>
+            <a:blipFill>
+              <a:blip r:embed="rId10"/>
+              <a:stretch>
+                <a:fillRect l="-171241" t="-51205" r="-44405" b="-105567"/>
+              </a:stretch>
+            </a:blipFill>
+          </p:spPr>
+          <p:txBody>
+            <a:bodyPr/>
+            <a:lstStyle/>
+            <a:p>
+              <a:endParaRPr lang="es-MX"/>
+            </a:p>
+          </p:txBody>
+        </p:sp>
+      </p:grpSp>
+      <p:sp>
+        <p:nvSpPr>
+          <p:cNvPr id="37" name="Freeform 37"/>
+          <p:cNvSpPr>
+            <a:spLocks noChangeAspect="1"/>
+          </p:cNvSpPr>
+          <p:nvPr/>
+        </p:nvSpPr>
+        <p:spPr>
+          <a:xfrm rot="1820298">
+            <a:off x="-7180481" y="-1248611"/>
+            <a:ext cx="4301092" cy="3722400"/>
+          </a:xfrm>
+          <a:custGeom>
+            <a:avLst/>
+            <a:gdLst/>
+            <a:ahLst/>
+            <a:cxnLst/>
+            <a:rect l="l" t="t" r="r" b="b"/>
+            <a:pathLst>
+              <a:path w="1898126" h="1642742">
+                <a:moveTo>
+                  <a:pt x="0" y="0"/>
+                </a:moveTo>
+                <a:lnTo>
+                  <a:pt x="1898126" y="0"/>
+                </a:lnTo>
+                <a:lnTo>
+                  <a:pt x="1898126" y="1642742"/>
+                </a:lnTo>
+                <a:lnTo>
+                  <a:pt x="0" y="1642742"/>
+                </a:lnTo>
+                <a:lnTo>
+                  <a:pt x="0" y="0"/>
+                </a:lnTo>
+                <a:close/>
+              </a:path>
+            </a:pathLst>
+          </a:custGeom>
+          <a:blipFill>
+            <a:blip r:embed="rId11">
+              <a:extLst>
+                <a:ext uri="{96DAC541-7B7A-43D3-8B79-37D633B846F1}">
+                  <asvg:svgBlip xmlns:asvg="http://schemas.microsoft.com/office/drawing/2016/SVG/main" r:embed="rId12"/>
+                </a:ext>
+              </a:extLst>
+            </a:blip>
+            <a:stretch>
+              <a:fillRect/>
+            </a:stretch>
+          </a:blipFill>
+        </p:spPr>
+        <p:txBody>
+          <a:bodyPr/>
+          <a:lstStyle/>
+          <a:p>
+            <a:endParaRPr lang="es-MX"/>
+          </a:p>
+        </p:txBody>
+      </p:sp>
+      <p:sp>
+        <p:nvSpPr>
+          <p:cNvPr id="38" name="Freeform 38"/>
+          <p:cNvSpPr>
+            <a:spLocks noChangeAspect="1"/>
+          </p:cNvSpPr>
+          <p:nvPr/>
+        </p:nvSpPr>
+        <p:spPr>
+          <a:xfrm rot="1820298">
+            <a:off x="-527528" y="-6762048"/>
+            <a:ext cx="4301092" cy="3722400"/>
+          </a:xfrm>
+          <a:custGeom>
+            <a:avLst/>
+            <a:gdLst/>
+            <a:ahLst/>
+            <a:cxnLst/>
+            <a:rect l="l" t="t" r="r" b="b"/>
+            <a:pathLst>
+              <a:path w="1898126" h="1642742">
+                <a:moveTo>
+                  <a:pt x="0" y="0"/>
+                </a:moveTo>
+                <a:lnTo>
+                  <a:pt x="1898126" y="0"/>
+                </a:lnTo>
+                <a:lnTo>
+                  <a:pt x="1898126" y="1642742"/>
+                </a:lnTo>
+                <a:lnTo>
+                  <a:pt x="0" y="1642742"/>
+                </a:lnTo>
+                <a:lnTo>
+                  <a:pt x="0" y="0"/>
+                </a:lnTo>
+                <a:close/>
+              </a:path>
+            </a:pathLst>
+          </a:custGeom>
+          <a:blipFill>
+            <a:blip r:embed="rId11">
+              <a:extLst>
+                <a:ext uri="{96DAC541-7B7A-43D3-8B79-37D633B846F1}">
+                  <asvg:svgBlip xmlns:asvg="http://schemas.microsoft.com/office/drawing/2016/SVG/main" r:embed="rId12"/>
+                </a:ext>
+              </a:extLst>
+            </a:blip>
+            <a:stretch>
+              <a:fillRect/>
+            </a:stretch>
+          </a:blipFill>
+        </p:spPr>
+        <p:txBody>
+          <a:bodyPr/>
+          <a:lstStyle/>
+          <a:p>
+            <a:endParaRPr lang="es-MX" dirty="0"/>
+          </a:p>
+        </p:txBody>
+      </p:sp>
+      <p:sp>
+        <p:nvSpPr>
+          <p:cNvPr id="39" name="Freeform 39"/>
+          <p:cNvSpPr>
+            <a:spLocks noChangeAspect="1"/>
+          </p:cNvSpPr>
+          <p:nvPr/>
+        </p:nvSpPr>
+        <p:spPr>
+          <a:xfrm rot="1820298">
+            <a:off x="10266621" y="-7192585"/>
+            <a:ext cx="4301092" cy="3722400"/>
+          </a:xfrm>
+          <a:custGeom>
+            <a:avLst/>
+            <a:gdLst/>
+            <a:ahLst/>
+            <a:cxnLst/>
+            <a:rect l="l" t="t" r="r" b="b"/>
+            <a:pathLst>
+              <a:path w="1898126" h="1642742">
+                <a:moveTo>
+                  <a:pt x="0" y="0"/>
+                </a:moveTo>
+                <a:lnTo>
+                  <a:pt x="1898126" y="0"/>
+                </a:lnTo>
+                <a:lnTo>
+                  <a:pt x="1898126" y="1642742"/>
+                </a:lnTo>
+                <a:lnTo>
+                  <a:pt x="0" y="1642742"/>
+                </a:lnTo>
+                <a:lnTo>
+                  <a:pt x="0" y="0"/>
+                </a:lnTo>
+                <a:close/>
+              </a:path>
+            </a:pathLst>
+          </a:custGeom>
+          <a:blipFill>
+            <a:blip r:embed="rId11">
+              <a:extLst>
+                <a:ext uri="{96DAC541-7B7A-43D3-8B79-37D633B846F1}">
+                  <asvg:svgBlip xmlns:asvg="http://schemas.microsoft.com/office/drawing/2016/SVG/main" r:embed="rId12"/>
+                </a:ext>
+              </a:extLst>
+            </a:blip>
+            <a:stretch>
+              <a:fillRect/>
+            </a:stretch>
+          </a:blipFill>
+        </p:spPr>
+        <p:txBody>
+          <a:bodyPr/>
+          <a:lstStyle/>
+          <a:p>
+            <a:endParaRPr lang="es-MX"/>
+          </a:p>
+        </p:txBody>
+      </p:sp>
+      <p:sp>
+        <p:nvSpPr>
+          <p:cNvPr id="46" name="Freeform 46"/>
+          <p:cNvSpPr>
+            <a:spLocks noChangeAspect="1"/>
+          </p:cNvSpPr>
+          <p:nvPr/>
+        </p:nvSpPr>
+        <p:spPr>
+          <a:xfrm rot="1820298">
+            <a:off x="-8338895" y="8807455"/>
+            <a:ext cx="4301092" cy="3722400"/>
+          </a:xfrm>
+          <a:custGeom>
+            <a:avLst/>
+            <a:gdLst/>
+            <a:ahLst/>
+            <a:cxnLst/>
+            <a:rect l="l" t="t" r="r" b="b"/>
+            <a:pathLst>
+              <a:path w="1898126" h="1642742">
+                <a:moveTo>
+                  <a:pt x="0" y="0"/>
+                </a:moveTo>
+                <a:lnTo>
+                  <a:pt x="1898126" y="0"/>
+                </a:lnTo>
+                <a:lnTo>
+                  <a:pt x="1898126" y="1642742"/>
+                </a:lnTo>
+                <a:lnTo>
+                  <a:pt x="0" y="1642742"/>
+                </a:lnTo>
+                <a:lnTo>
+                  <a:pt x="0" y="0"/>
+                </a:lnTo>
+                <a:close/>
+              </a:path>
+            </a:pathLst>
+          </a:custGeom>
+          <a:blipFill>
+            <a:blip r:embed="rId11">
+              <a:extLst>
+                <a:ext uri="{96DAC541-7B7A-43D3-8B79-37D633B846F1}">
+                  <asvg:svgBlip xmlns:asvg="http://schemas.microsoft.com/office/drawing/2016/SVG/main" r:embed="rId12"/>
+                </a:ext>
+              </a:extLst>
+            </a:blip>
+            <a:stretch>
+              <a:fillRect/>
+            </a:stretch>
+          </a:blipFill>
+        </p:spPr>
+        <p:txBody>
+          <a:bodyPr/>
+          <a:lstStyle/>
+          <a:p>
+            <a:endParaRPr lang="es-MX"/>
+          </a:p>
+        </p:txBody>
+      </p:sp>
+      <p:sp>
+        <p:nvSpPr>
+          <p:cNvPr id="47" name="Freeform 47"/>
+          <p:cNvSpPr>
+            <a:spLocks noChangeAspect="1"/>
+          </p:cNvSpPr>
+          <p:nvPr/>
+        </p:nvSpPr>
+        <p:spPr>
+          <a:xfrm rot="1820298">
+            <a:off x="1830368" y="13741207"/>
+            <a:ext cx="4301092" cy="3722400"/>
+          </a:xfrm>
+          <a:custGeom>
+            <a:avLst/>
+            <a:gdLst/>
+            <a:ahLst/>
+            <a:cxnLst/>
+            <a:rect l="l" t="t" r="r" b="b"/>
+            <a:pathLst>
+              <a:path w="1898126" h="1642742">
+                <a:moveTo>
+                  <a:pt x="0" y="0"/>
+                </a:moveTo>
+                <a:lnTo>
+                  <a:pt x="1898126" y="0"/>
+                </a:lnTo>
+                <a:lnTo>
+                  <a:pt x="1898126" y="1642741"/>
+                </a:lnTo>
+                <a:lnTo>
+                  <a:pt x="0" y="1642741"/>
+                </a:lnTo>
+                <a:lnTo>
+                  <a:pt x="0" y="0"/>
+                </a:lnTo>
+                <a:close/>
+              </a:path>
+            </a:pathLst>
+          </a:custGeom>
+          <a:blipFill>
+            <a:blip r:embed="rId11">
+              <a:extLst>
+                <a:ext uri="{96DAC541-7B7A-43D3-8B79-37D633B846F1}">
+                  <asvg:svgBlip xmlns:asvg="http://schemas.microsoft.com/office/drawing/2016/SVG/main" r:embed="rId12"/>
+                </a:ext>
+              </a:extLst>
+            </a:blip>
+            <a:stretch>
+              <a:fillRect/>
+            </a:stretch>
+          </a:blipFill>
+        </p:spPr>
+        <p:txBody>
+          <a:bodyPr/>
+          <a:lstStyle/>
+          <a:p>
+            <a:endParaRPr lang="es-MX"/>
+          </a:p>
+        </p:txBody>
+      </p:sp>
+      <p:sp>
+        <p:nvSpPr>
+          <p:cNvPr id="54" name="TextBox 43">
+            <a:extLst>
+              <a:ext uri="{FF2B5EF4-FFF2-40B4-BE49-F238E27FC236}">
+                <a16:creationId xmlns:a16="http://schemas.microsoft.com/office/drawing/2014/main" id="{D4EB5AF6-E9B5-4B6A-2A52-AE762B69EB0C}"/>
+              </a:ext>
+            </a:extLst>
+          </p:cNvPr>
+          <p:cNvSpPr txBox="1"/>
+          <p:nvPr/>
+        </p:nvSpPr>
+        <p:spPr>
+          <a:xfrm>
+            <a:off x="11875938" y="9078949"/>
+            <a:ext cx="6304810" cy="1052211"/>
+          </a:xfrm>
+          <a:prstGeom prst="rect">
+            <a:avLst/>
+          </a:prstGeom>
+        </p:spPr>
+        <p:txBody>
+          <a:bodyPr wrap="square" lIns="0" tIns="0" rIns="0" bIns="0" rtlCol="0" anchor="t">
+            <a:spAutoFit/>
+          </a:bodyPr>
+          <a:lstStyle/>
+          <a:p>
+            <a:pPr algn="r">
+              <a:lnSpc>
+                <a:spcPts val="10080"/>
+              </a:lnSpc>
+              <a:spcBef>
+                <a:spcPct val="0"/>
+              </a:spcBef>
+            </a:pPr>
+            <a:r>
+              <a:rPr lang="en-US" sz="2100" dirty="0" err="1">
+                <a:latin typeface="League Spartan Bold"/>
+              </a:rPr>
+              <a:t>TinyML</a:t>
+            </a:r>
+            <a:r>
+              <a:rPr lang="en-US" sz="2100" dirty="0">
+                <a:latin typeface="League Spartan Bold"/>
+              </a:rPr>
+              <a:t> - El </a:t>
+            </a:r>
+            <a:r>
+              <a:rPr lang="en-US" sz="2100" dirty="0" err="1">
+                <a:latin typeface="League Spartan Bold"/>
+              </a:rPr>
+              <a:t>poder</a:t>
+            </a:r>
+            <a:r>
+              <a:rPr lang="en-US" sz="2100" dirty="0">
+                <a:latin typeface="League Spartan Bold"/>
+              </a:rPr>
+              <a:t> de </a:t>
+            </a:r>
+            <a:r>
+              <a:rPr lang="en-US" sz="2100" dirty="0" err="1">
+                <a:latin typeface="League Spartan Bold"/>
+              </a:rPr>
+              <a:t>los</a:t>
+            </a:r>
+            <a:r>
+              <a:rPr lang="en-US" sz="2100" dirty="0">
+                <a:latin typeface="League Spartan Bold"/>
+              </a:rPr>
+              <a:t> </a:t>
+            </a:r>
+            <a:r>
+              <a:rPr lang="en-US" sz="2100" dirty="0" err="1">
+                <a:latin typeface="League Spartan Bold"/>
+              </a:rPr>
+              <a:t>microcontroladores</a:t>
+            </a:r>
+            <a:endParaRPr lang="en-US" sz="2100" dirty="0">
+              <a:latin typeface="League Spartan Bold"/>
+            </a:endParaRPr>
+          </a:p>
+        </p:txBody>
+      </p:sp>
+      <p:sp>
+        <p:nvSpPr>
+          <p:cNvPr id="15" name="TextBox 43">
+            <a:extLst>
+              <a:ext uri="{FF2B5EF4-FFF2-40B4-BE49-F238E27FC236}">
+                <a16:creationId xmlns:a16="http://schemas.microsoft.com/office/drawing/2014/main" id="{AF319191-6148-4552-BE20-E8E83F5958D4}"/>
+              </a:ext>
+            </a:extLst>
+          </p:cNvPr>
+          <p:cNvSpPr txBox="1"/>
+          <p:nvPr/>
+        </p:nvSpPr>
+        <p:spPr>
+          <a:xfrm>
+            <a:off x="580190" y="1951987"/>
+            <a:ext cx="16945810" cy="1215141"/>
+          </a:xfrm>
+          <a:prstGeom prst="rect">
+            <a:avLst/>
+          </a:prstGeom>
+        </p:spPr>
+        <p:txBody>
+          <a:bodyPr wrap="square" lIns="0" tIns="0" rIns="0" bIns="0" rtlCol="0" anchor="t">
+            <a:spAutoFit/>
+          </a:bodyPr>
+          <a:lstStyle/>
+          <a:p>
+            <a:pPr algn="r">
+              <a:lnSpc>
+                <a:spcPts val="10080"/>
+              </a:lnSpc>
+              <a:spcBef>
+                <a:spcPct val="0"/>
+              </a:spcBef>
+            </a:pPr>
+            <a:r>
+              <a:rPr lang="en-US" sz="7200" dirty="0">
+                <a:solidFill>
+                  <a:srgbClr val="FFFFFF"/>
+                </a:solidFill>
+                <a:latin typeface="League Spartan Bold"/>
+              </a:rPr>
+              <a:t>Y </a:t>
+            </a:r>
+            <a:r>
+              <a:rPr lang="en-US" sz="7200" dirty="0" err="1">
+                <a:solidFill>
+                  <a:srgbClr val="FFFFFF"/>
+                </a:solidFill>
+                <a:latin typeface="League Spartan Bold"/>
+              </a:rPr>
+              <a:t>así</a:t>
+            </a:r>
+            <a:r>
+              <a:rPr lang="en-US" sz="7200" dirty="0">
+                <a:solidFill>
+                  <a:srgbClr val="FFFFFF"/>
+                </a:solidFill>
+                <a:latin typeface="League Spartan Bold"/>
+              </a:rPr>
+              <a:t> </a:t>
+            </a:r>
+            <a:r>
+              <a:rPr lang="en-US" sz="7200" dirty="0" err="1">
+                <a:solidFill>
+                  <a:srgbClr val="FFFFFF"/>
+                </a:solidFill>
+                <a:latin typeface="League Spartan Bold"/>
+              </a:rPr>
+              <a:t>concluye</a:t>
+            </a:r>
+            <a:endParaRPr lang="en-US" sz="7200" dirty="0">
+              <a:solidFill>
+                <a:srgbClr val="366994"/>
+              </a:solidFill>
+              <a:latin typeface="League Spartan Bold"/>
+            </a:endParaRPr>
+          </a:p>
+        </p:txBody>
+      </p:sp>
+      <p:grpSp>
+        <p:nvGrpSpPr>
+          <p:cNvPr id="16" name="Group 40">
+            <a:extLst>
+              <a:ext uri="{FF2B5EF4-FFF2-40B4-BE49-F238E27FC236}">
+                <a16:creationId xmlns:a16="http://schemas.microsoft.com/office/drawing/2014/main" id="{9909EF86-EC81-A22E-237D-A08ED4D64C0A}"/>
+              </a:ext>
+            </a:extLst>
+          </p:cNvPr>
+          <p:cNvGrpSpPr/>
+          <p:nvPr/>
+        </p:nvGrpSpPr>
+        <p:grpSpPr>
+          <a:xfrm>
+            <a:off x="20246401" y="-5156900"/>
+            <a:ext cx="3865133" cy="3721964"/>
+            <a:chOff x="0" y="0"/>
+            <a:chExt cx="3290600" cy="3168712"/>
+          </a:xfrm>
+        </p:grpSpPr>
+        <p:sp>
+          <p:nvSpPr>
+            <p:cNvPr id="17" name="Freeform 41">
+              <a:extLst>
+                <a:ext uri="{FF2B5EF4-FFF2-40B4-BE49-F238E27FC236}">
+                  <a16:creationId xmlns:a16="http://schemas.microsoft.com/office/drawing/2014/main" id="{797994A6-D33E-0541-22D3-9A7B3C39925E}"/>
+                </a:ext>
+              </a:extLst>
+            </p:cNvPr>
+            <p:cNvSpPr/>
+            <p:nvPr/>
+          </p:nvSpPr>
+          <p:spPr>
+            <a:xfrm rot="1820298">
+              <a:off x="379882" y="489195"/>
+              <a:ext cx="2530835" cy="2190322"/>
+            </a:xfrm>
+            <a:custGeom>
+              <a:avLst/>
+              <a:gdLst/>
+              <a:ahLst/>
+              <a:cxnLst/>
+              <a:rect l="l" t="t" r="r" b="b"/>
+              <a:pathLst>
+                <a:path w="2530835" h="2190322">
+                  <a:moveTo>
+                    <a:pt x="0" y="0"/>
+                  </a:moveTo>
+                  <a:lnTo>
+                    <a:pt x="2530835" y="0"/>
+                  </a:lnTo>
+                  <a:lnTo>
+                    <a:pt x="2530835" y="2190322"/>
+                  </a:lnTo>
+                  <a:lnTo>
+                    <a:pt x="0" y="2190322"/>
+                  </a:lnTo>
+                  <a:lnTo>
+                    <a:pt x="0" y="0"/>
+                  </a:lnTo>
+                  <a:close/>
+                </a:path>
+              </a:pathLst>
+            </a:custGeom>
+            <a:blipFill>
+              <a:blip r:embed="rId7">
+                <a:extLst>
+                  <a:ext uri="{96DAC541-7B7A-43D3-8B79-37D633B846F1}">
+                    <asvg:svgBlip xmlns:asvg="http://schemas.microsoft.com/office/drawing/2016/SVG/main" r:embed="rId8"/>
+                  </a:ext>
+                </a:extLst>
+              </a:blip>
+              <a:stretch>
+                <a:fillRect/>
+              </a:stretch>
+            </a:blipFill>
+          </p:spPr>
+          <p:txBody>
+            <a:bodyPr/>
+            <a:lstStyle/>
+            <a:p>
+              <a:endParaRPr lang="es-MX"/>
+            </a:p>
+          </p:txBody>
+        </p:sp>
+        <p:sp>
+          <p:nvSpPr>
+            <p:cNvPr id="18" name="Freeform 42">
+              <a:extLst>
+                <a:ext uri="{FF2B5EF4-FFF2-40B4-BE49-F238E27FC236}">
+                  <a16:creationId xmlns:a16="http://schemas.microsoft.com/office/drawing/2014/main" id="{CA3534BD-ABB7-3311-7FCF-1A15E87CF5C8}"/>
+                </a:ext>
+              </a:extLst>
+            </p:cNvPr>
+            <p:cNvSpPr/>
+            <p:nvPr/>
+          </p:nvSpPr>
+          <p:spPr>
+            <a:xfrm>
+              <a:off x="859599" y="802941"/>
+              <a:ext cx="1571402" cy="1562830"/>
+            </a:xfrm>
+            <a:custGeom>
+              <a:avLst/>
+              <a:gdLst/>
+              <a:ahLst/>
+              <a:cxnLst/>
+              <a:rect l="l" t="t" r="r" b="b"/>
+              <a:pathLst>
+                <a:path w="1571402" h="1562830">
+                  <a:moveTo>
+                    <a:pt x="0" y="0"/>
+                  </a:moveTo>
+                  <a:lnTo>
+                    <a:pt x="1571402" y="0"/>
+                  </a:lnTo>
+                  <a:lnTo>
+                    <a:pt x="1571402" y="1562830"/>
+                  </a:lnTo>
+                  <a:lnTo>
+                    <a:pt x="0" y="1562830"/>
+                  </a:lnTo>
+                  <a:lnTo>
+                    <a:pt x="0" y="0"/>
+                  </a:lnTo>
+                  <a:close/>
+                </a:path>
+              </a:pathLst>
+            </a:custGeom>
+            <a:blipFill>
+              <a:blip r:embed="rId13">
+                <a:extLst>
+                  <a:ext uri="{96DAC541-7B7A-43D3-8B79-37D633B846F1}">
+                    <asvg:svgBlip xmlns:asvg="http://schemas.microsoft.com/office/drawing/2016/SVG/main" r:embed="rId14"/>
+                  </a:ext>
+                </a:extLst>
+              </a:blip>
+              <a:stretch>
+                <a:fillRect/>
+              </a:stretch>
+            </a:blipFill>
+          </p:spPr>
+          <p:txBody>
+            <a:bodyPr/>
+            <a:lstStyle/>
+            <a:p>
+              <a:endParaRPr lang="es-MX"/>
+            </a:p>
+          </p:txBody>
+        </p:sp>
+      </p:grpSp>
+      <p:grpSp>
+        <p:nvGrpSpPr>
+          <p:cNvPr id="19" name="Group 43">
+            <a:extLst>
+              <a:ext uri="{FF2B5EF4-FFF2-40B4-BE49-F238E27FC236}">
+                <a16:creationId xmlns:a16="http://schemas.microsoft.com/office/drawing/2014/main" id="{3DD48752-60D7-1574-F060-2B035A8816B0}"/>
+              </a:ext>
+            </a:extLst>
+          </p:cNvPr>
+          <p:cNvGrpSpPr>
+            <a:grpSpLocks noChangeAspect="1"/>
+          </p:cNvGrpSpPr>
+          <p:nvPr/>
+        </p:nvGrpSpPr>
+        <p:grpSpPr>
+          <a:xfrm>
+            <a:off x="20955000" y="3022703"/>
+            <a:ext cx="3865586" cy="3722400"/>
+            <a:chOff x="0" y="0"/>
+            <a:chExt cx="3290600" cy="3168712"/>
+          </a:xfrm>
+        </p:grpSpPr>
+        <p:sp>
+          <p:nvSpPr>
+            <p:cNvPr id="20" name="Freeform 44">
+              <a:extLst>
+                <a:ext uri="{FF2B5EF4-FFF2-40B4-BE49-F238E27FC236}">
+                  <a16:creationId xmlns:a16="http://schemas.microsoft.com/office/drawing/2014/main" id="{0186FB69-CF56-C591-C289-66B42E413224}"/>
+                </a:ext>
+              </a:extLst>
+            </p:cNvPr>
+            <p:cNvSpPr/>
+            <p:nvPr/>
+          </p:nvSpPr>
+          <p:spPr>
+            <a:xfrm rot="1820298">
+              <a:off x="379882" y="489195"/>
+              <a:ext cx="2530835" cy="2190322"/>
+            </a:xfrm>
+            <a:custGeom>
+              <a:avLst/>
+              <a:gdLst/>
+              <a:ahLst/>
+              <a:cxnLst/>
+              <a:rect l="l" t="t" r="r" b="b"/>
+              <a:pathLst>
+                <a:path w="2530835" h="2190322">
+                  <a:moveTo>
+                    <a:pt x="0" y="0"/>
+                  </a:moveTo>
+                  <a:lnTo>
+                    <a:pt x="2530835" y="0"/>
+                  </a:lnTo>
+                  <a:lnTo>
+                    <a:pt x="2530835" y="2190322"/>
+                  </a:lnTo>
+                  <a:lnTo>
+                    <a:pt x="0" y="2190322"/>
+                  </a:lnTo>
+                  <a:lnTo>
+                    <a:pt x="0" y="0"/>
+                  </a:lnTo>
+                  <a:close/>
+                </a:path>
+              </a:pathLst>
+            </a:custGeom>
+            <a:blipFill>
+              <a:blip r:embed="rId7">
+                <a:extLst>
+                  <a:ext uri="{96DAC541-7B7A-43D3-8B79-37D633B846F1}">
+                    <asvg:svgBlip xmlns:asvg="http://schemas.microsoft.com/office/drawing/2016/SVG/main" r:embed="rId8"/>
+                  </a:ext>
+                </a:extLst>
+              </a:blip>
+              <a:stretch>
+                <a:fillRect/>
+              </a:stretch>
+            </a:blipFill>
+          </p:spPr>
+          <p:txBody>
+            <a:bodyPr/>
+            <a:lstStyle/>
+            <a:p>
+              <a:endParaRPr lang="es-MX"/>
+            </a:p>
+          </p:txBody>
+        </p:sp>
+        <p:sp>
+          <p:nvSpPr>
+            <p:cNvPr id="21" name="Freeform 45">
+              <a:extLst>
+                <a:ext uri="{FF2B5EF4-FFF2-40B4-BE49-F238E27FC236}">
+                  <a16:creationId xmlns:a16="http://schemas.microsoft.com/office/drawing/2014/main" id="{BC0F3474-61EF-BDBC-9FEA-CC32680992BA}"/>
+                </a:ext>
+              </a:extLst>
+            </p:cNvPr>
+            <p:cNvSpPr/>
+            <p:nvPr/>
+          </p:nvSpPr>
+          <p:spPr>
+            <a:xfrm>
+              <a:off x="717981" y="657037"/>
+              <a:ext cx="1854638" cy="1854638"/>
+            </a:xfrm>
+            <a:custGeom>
+              <a:avLst/>
+              <a:gdLst/>
+              <a:ahLst/>
+              <a:cxnLst/>
+              <a:rect l="l" t="t" r="r" b="b"/>
+              <a:pathLst>
+                <a:path w="1854638" h="1854638">
+                  <a:moveTo>
+                    <a:pt x="0" y="0"/>
+                  </a:moveTo>
+                  <a:lnTo>
+                    <a:pt x="1854638" y="0"/>
+                  </a:lnTo>
+                  <a:lnTo>
+                    <a:pt x="1854638" y="1854638"/>
+                  </a:lnTo>
+                  <a:lnTo>
+                    <a:pt x="0" y="1854638"/>
+                  </a:lnTo>
+                  <a:lnTo>
+                    <a:pt x="0" y="0"/>
+                  </a:lnTo>
+                  <a:close/>
+                </a:path>
+              </a:pathLst>
+            </a:custGeom>
+            <a:blipFill>
+              <a:blip r:embed="rId15"/>
+              <a:stretch>
+                <a:fillRect/>
+              </a:stretch>
+            </a:blipFill>
+          </p:spPr>
+          <p:txBody>
+            <a:bodyPr/>
+            <a:lstStyle/>
+            <a:p>
+              <a:endParaRPr lang="es-MX"/>
+            </a:p>
+          </p:txBody>
+        </p:sp>
+      </p:grpSp>
+      <p:pic>
+        <p:nvPicPr>
+          <p:cNvPr id="22" name="Imagen 21" descr="Forma&#10;&#10;Descripción generada automáticamente con confianza media">
+            <a:extLst>
+              <a:ext uri="{FF2B5EF4-FFF2-40B4-BE49-F238E27FC236}">
+                <a16:creationId xmlns:a16="http://schemas.microsoft.com/office/drawing/2014/main" id="{2700F645-A106-724A-A984-FABDA57B201B}"/>
+              </a:ext>
+            </a:extLst>
+          </p:cNvPr>
+          <p:cNvPicPr>
+            <a:picLocks noChangeAspect="1"/>
+          </p:cNvPicPr>
+          <p:nvPr/>
+        </p:nvPicPr>
+        <p:blipFill>
+          <a:blip r:embed="rId16">
+            <a:extLst>
+              <a:ext uri="{28A0092B-C50C-407E-A947-70E740481C1C}">
+                <a14:useLocalDpi xmlns:a14="http://schemas.microsoft.com/office/drawing/2010/main" val="0"/>
+              </a:ext>
+            </a:extLst>
+          </a:blip>
+          <a:stretch>
+            <a:fillRect/>
+          </a:stretch>
+        </p:blipFill>
+        <p:spPr>
+          <a:xfrm>
+            <a:off x="2636310" y="9628214"/>
+            <a:ext cx="2523747" cy="669441"/>
+          </a:xfrm>
+          <a:prstGeom prst="rect">
+            <a:avLst/>
+          </a:prstGeom>
+        </p:spPr>
+      </p:pic>
+      <p:grpSp>
+        <p:nvGrpSpPr>
+          <p:cNvPr id="29" name="Grupo 28">
+            <a:extLst>
+              <a:ext uri="{FF2B5EF4-FFF2-40B4-BE49-F238E27FC236}">
+                <a16:creationId xmlns:a16="http://schemas.microsoft.com/office/drawing/2014/main" id="{AF7889B5-C65B-2CAB-3496-6C4483024D4C}"/>
+              </a:ext>
+            </a:extLst>
+          </p:cNvPr>
+          <p:cNvGrpSpPr/>
+          <p:nvPr/>
+        </p:nvGrpSpPr>
+        <p:grpSpPr>
+          <a:xfrm>
+            <a:off x="614045" y="2310275"/>
+            <a:ext cx="4840671" cy="5785910"/>
+            <a:chOff x="12312234" y="5873816"/>
+            <a:chExt cx="2718790" cy="3249689"/>
+          </a:xfrm>
+        </p:grpSpPr>
+        <p:grpSp>
+          <p:nvGrpSpPr>
+            <p:cNvPr id="30" name="Group 18">
+              <a:extLst>
+                <a:ext uri="{FF2B5EF4-FFF2-40B4-BE49-F238E27FC236}">
+                  <a16:creationId xmlns:a16="http://schemas.microsoft.com/office/drawing/2014/main" id="{F754504F-8C8C-715B-C7AA-5256F5AAE1AA}"/>
+                </a:ext>
+              </a:extLst>
+            </p:cNvPr>
+            <p:cNvGrpSpPr/>
+            <p:nvPr/>
+          </p:nvGrpSpPr>
+          <p:grpSpPr>
+            <a:xfrm>
+              <a:off x="12312234" y="5873816"/>
+              <a:ext cx="2718790" cy="3249688"/>
+              <a:chOff x="0" y="0"/>
+              <a:chExt cx="1482282" cy="1771728"/>
+            </a:xfrm>
+          </p:grpSpPr>
+          <p:sp>
+            <p:nvSpPr>
+              <p:cNvPr id="40" name="Freeform 19">
+                <a:extLst>
+                  <a:ext uri="{FF2B5EF4-FFF2-40B4-BE49-F238E27FC236}">
+                    <a16:creationId xmlns:a16="http://schemas.microsoft.com/office/drawing/2014/main" id="{4A352A93-F3EB-39A1-4C7C-FB275982E746}"/>
+                  </a:ext>
+                </a:extLst>
+              </p:cNvPr>
+              <p:cNvSpPr/>
+              <p:nvPr/>
+            </p:nvSpPr>
+            <p:spPr>
+              <a:xfrm>
+                <a:off x="0" y="0"/>
+                <a:ext cx="1482283" cy="1771728"/>
+              </a:xfrm>
+              <a:custGeom>
+                <a:avLst/>
+                <a:gdLst/>
+                <a:ahLst/>
+                <a:cxnLst/>
+                <a:rect l="l" t="t" r="r" b="b"/>
+                <a:pathLst>
+                  <a:path w="1482283" h="1771728">
+                    <a:moveTo>
+                      <a:pt x="1357822" y="1771728"/>
+                    </a:moveTo>
+                    <a:lnTo>
+                      <a:pt x="124460" y="1771728"/>
+                    </a:lnTo>
+                    <a:cubicBezTo>
+                      <a:pt x="55880" y="1771728"/>
+                      <a:pt x="0" y="1715848"/>
+                      <a:pt x="0" y="1647268"/>
+                    </a:cubicBezTo>
+                    <a:lnTo>
+                      <a:pt x="0" y="124460"/>
+                    </a:lnTo>
+                    <a:cubicBezTo>
+                      <a:pt x="0" y="55880"/>
+                      <a:pt x="55880" y="0"/>
+                      <a:pt x="124460" y="0"/>
+                    </a:cubicBezTo>
+                    <a:lnTo>
+                      <a:pt x="1357823" y="0"/>
+                    </a:lnTo>
+                    <a:cubicBezTo>
+                      <a:pt x="1426402" y="0"/>
+                      <a:pt x="1482283" y="55880"/>
+                      <a:pt x="1482283" y="124460"/>
+                    </a:cubicBezTo>
+                    <a:lnTo>
+                      <a:pt x="1482283" y="1647268"/>
+                    </a:lnTo>
+                    <a:cubicBezTo>
+                      <a:pt x="1482283" y="1715848"/>
+                      <a:pt x="1426402" y="1771728"/>
+                      <a:pt x="1357823" y="1771728"/>
+                    </a:cubicBezTo>
+                    <a:close/>
+                  </a:path>
+                </a:pathLst>
+              </a:custGeom>
+              <a:solidFill>
+                <a:srgbClr val="000000"/>
+              </a:solidFill>
+            </p:spPr>
+            <p:txBody>
+              <a:bodyPr/>
+              <a:lstStyle/>
+              <a:p>
+                <a:endParaRPr lang="es-MX"/>
+              </a:p>
+            </p:txBody>
+          </p:sp>
+        </p:grpSp>
+        <p:grpSp>
+          <p:nvGrpSpPr>
+            <p:cNvPr id="31" name="Group 20">
+              <a:extLst>
+                <a:ext uri="{FF2B5EF4-FFF2-40B4-BE49-F238E27FC236}">
+                  <a16:creationId xmlns:a16="http://schemas.microsoft.com/office/drawing/2014/main" id="{7B37113A-4D71-8FD6-B2B2-9392A4D4F4CB}"/>
+                </a:ext>
+              </a:extLst>
+            </p:cNvPr>
+            <p:cNvGrpSpPr/>
+            <p:nvPr/>
+          </p:nvGrpSpPr>
+          <p:grpSpPr>
+            <a:xfrm>
+              <a:off x="12421697" y="6227168"/>
+              <a:ext cx="2524516" cy="2896337"/>
+              <a:chOff x="0" y="0"/>
+              <a:chExt cx="1215851" cy="1394927"/>
+            </a:xfrm>
+          </p:grpSpPr>
+          <p:sp>
+            <p:nvSpPr>
+              <p:cNvPr id="36" name="Freeform 21">
+                <a:extLst>
+                  <a:ext uri="{FF2B5EF4-FFF2-40B4-BE49-F238E27FC236}">
+                    <a16:creationId xmlns:a16="http://schemas.microsoft.com/office/drawing/2014/main" id="{0BFF68D8-9C21-9CC5-FDAE-187530E1828F}"/>
+                  </a:ext>
+                </a:extLst>
+              </p:cNvPr>
+              <p:cNvSpPr/>
+              <p:nvPr/>
+            </p:nvSpPr>
+            <p:spPr>
+              <a:xfrm>
+                <a:off x="0" y="0"/>
+                <a:ext cx="1215851" cy="1394927"/>
+              </a:xfrm>
+              <a:custGeom>
+                <a:avLst/>
+                <a:gdLst/>
+                <a:ahLst/>
+                <a:cxnLst/>
+                <a:rect l="l" t="t" r="r" b="b"/>
+                <a:pathLst>
+                  <a:path w="1215851" h="1394927">
+                    <a:moveTo>
+                      <a:pt x="1091391" y="1394926"/>
+                    </a:moveTo>
+                    <a:lnTo>
+                      <a:pt x="124460" y="1394926"/>
+                    </a:lnTo>
+                    <a:cubicBezTo>
+                      <a:pt x="55880" y="1394926"/>
+                      <a:pt x="0" y="1339047"/>
+                      <a:pt x="0" y="1270466"/>
+                    </a:cubicBezTo>
+                    <a:lnTo>
+                      <a:pt x="0" y="124460"/>
+                    </a:lnTo>
+                    <a:cubicBezTo>
+                      <a:pt x="0" y="55880"/>
+                      <a:pt x="55880" y="0"/>
+                      <a:pt x="124460" y="0"/>
+                    </a:cubicBezTo>
+                    <a:lnTo>
+                      <a:pt x="1091391" y="0"/>
+                    </a:lnTo>
+                    <a:cubicBezTo>
+                      <a:pt x="1159971" y="0"/>
+                      <a:pt x="1215851" y="55880"/>
+                      <a:pt x="1215851" y="124460"/>
+                    </a:cubicBezTo>
+                    <a:lnTo>
+                      <a:pt x="1215851" y="1270467"/>
+                    </a:lnTo>
+                    <a:cubicBezTo>
+                      <a:pt x="1215851" y="1339047"/>
+                      <a:pt x="1159971" y="1394927"/>
+                      <a:pt x="1091391" y="1394927"/>
+                    </a:cubicBezTo>
+                    <a:close/>
+                  </a:path>
+                </a:pathLst>
+              </a:custGeom>
+              <a:solidFill>
+                <a:srgbClr val="000000"/>
+              </a:solidFill>
+            </p:spPr>
+            <p:txBody>
+              <a:bodyPr/>
+              <a:lstStyle/>
+              <a:p>
+                <a:endParaRPr lang="es-MX"/>
+              </a:p>
+            </p:txBody>
+          </p:sp>
+        </p:grpSp>
+        <p:sp>
+          <p:nvSpPr>
+            <p:cNvPr id="32" name="Freeform 23">
+              <a:extLst>
+                <a:ext uri="{FF2B5EF4-FFF2-40B4-BE49-F238E27FC236}">
+                  <a16:creationId xmlns:a16="http://schemas.microsoft.com/office/drawing/2014/main" id="{8FDE94CA-8BD5-BF94-EC9B-C0CE9FA0E82B}"/>
+                </a:ext>
+              </a:extLst>
+            </p:cNvPr>
+            <p:cNvSpPr/>
+            <p:nvPr/>
+          </p:nvSpPr>
+          <p:spPr>
+            <a:xfrm>
+              <a:off x="12421697" y="5967474"/>
+              <a:ext cx="2524516" cy="2525021"/>
+            </a:xfrm>
+            <a:custGeom>
+              <a:avLst/>
+              <a:gdLst/>
+              <a:ahLst/>
+              <a:cxnLst/>
+              <a:rect l="l" t="t" r="r" b="b"/>
+              <a:pathLst>
+                <a:path w="6350000" h="6351270">
+                  <a:moveTo>
+                    <a:pt x="0" y="5955030"/>
+                  </a:moveTo>
+                  <a:lnTo>
+                    <a:pt x="0" y="394970"/>
+                  </a:lnTo>
+                  <a:cubicBezTo>
+                    <a:pt x="0" y="176530"/>
+                    <a:pt x="176530" y="0"/>
+                    <a:pt x="394970" y="0"/>
+                  </a:cubicBezTo>
+                  <a:lnTo>
+                    <a:pt x="5956300" y="0"/>
+                  </a:lnTo>
+                  <a:cubicBezTo>
+                    <a:pt x="6173470" y="0"/>
+                    <a:pt x="6350000" y="176530"/>
+                    <a:pt x="6350000" y="394970"/>
+                  </a:cubicBezTo>
+                  <a:cubicBezTo>
+                    <a:pt x="6350000" y="394970"/>
+                    <a:pt x="6350000" y="394970"/>
+                    <a:pt x="6350000" y="394970"/>
+                  </a:cubicBezTo>
+                  <a:lnTo>
+                    <a:pt x="6350000" y="5956300"/>
+                  </a:lnTo>
+                  <a:cubicBezTo>
+                    <a:pt x="6350000" y="6174740"/>
+                    <a:pt x="6173470" y="6351270"/>
+                    <a:pt x="5955030" y="6351270"/>
+                  </a:cubicBezTo>
+                  <a:lnTo>
+                    <a:pt x="5955030" y="6351270"/>
+                  </a:lnTo>
+                  <a:lnTo>
+                    <a:pt x="394970" y="6351270"/>
+                  </a:lnTo>
+                  <a:cubicBezTo>
+                    <a:pt x="176530" y="6350000"/>
+                    <a:pt x="0" y="6173470"/>
+                    <a:pt x="0" y="5955030"/>
+                  </a:cubicBezTo>
+                  <a:cubicBezTo>
+                    <a:pt x="0" y="5955030"/>
+                    <a:pt x="0" y="5955030"/>
+                    <a:pt x="0" y="5955030"/>
+                  </a:cubicBezTo>
+                  <a:close/>
+                </a:path>
+              </a:pathLst>
+            </a:custGeom>
+            <a:blipFill>
+              <a:blip r:embed="rId17"/>
+              <a:stretch>
+                <a:fillRect l="-10" r="-10"/>
+              </a:stretch>
+            </a:blipFill>
+          </p:spPr>
+          <p:txBody>
+            <a:bodyPr/>
+            <a:lstStyle/>
+            <a:p>
+              <a:endParaRPr lang="es-MX"/>
+            </a:p>
+          </p:txBody>
+        </p:sp>
+        <p:sp>
+          <p:nvSpPr>
+            <p:cNvPr id="35" name="TextBox 41">
+              <a:extLst>
+                <a:ext uri="{FF2B5EF4-FFF2-40B4-BE49-F238E27FC236}">
+                  <a16:creationId xmlns:a16="http://schemas.microsoft.com/office/drawing/2014/main" id="{B7B491D6-9A18-ED66-5E19-59D3CC34CF56}"/>
+                </a:ext>
+              </a:extLst>
+            </p:cNvPr>
+            <p:cNvSpPr txBox="1"/>
+            <p:nvPr/>
+          </p:nvSpPr>
+          <p:spPr>
+            <a:xfrm>
+              <a:off x="12421697" y="8539232"/>
+              <a:ext cx="2524516" cy="338311"/>
+            </a:xfrm>
+            <a:prstGeom prst="rect">
+              <a:avLst/>
+            </a:prstGeom>
+          </p:spPr>
+          <p:txBody>
+            <a:bodyPr lIns="0" tIns="0" rIns="0" bIns="0" rtlCol="0" anchor="t">
+              <a:spAutoFit/>
+            </a:bodyPr>
+            <a:lstStyle/>
+            <a:p>
+              <a:pPr algn="ctr">
+                <a:lnSpc>
+                  <a:spcPts val="3499"/>
+                </a:lnSpc>
+              </a:pPr>
+              <a:r>
+                <a:rPr lang="en-US" sz="2499" dirty="0" err="1">
+                  <a:solidFill>
+                    <a:srgbClr val="FFFFFF"/>
+                  </a:solidFill>
+                  <a:latin typeface="League Spartan Bold"/>
+                </a:rPr>
+                <a:t>Concluyamos</a:t>
+              </a:r>
+              <a:r>
+                <a:rPr lang="en-US" sz="2499" dirty="0">
+                  <a:solidFill>
+                    <a:srgbClr val="FFFFFF"/>
+                  </a:solidFill>
+                  <a:latin typeface="League Spartan Bold"/>
+                </a:rPr>
+                <a:t> </a:t>
+              </a:r>
+              <a:r>
+                <a:rPr lang="en-US" sz="2499" dirty="0" err="1">
+                  <a:solidFill>
+                    <a:srgbClr val="FFFFFF"/>
+                  </a:solidFill>
+                  <a:latin typeface="League Spartan Bold"/>
+                </a:rPr>
+                <a:t>esto</a:t>
+              </a:r>
+              <a:endParaRPr lang="en-US" sz="2499" dirty="0">
+                <a:solidFill>
+                  <a:srgbClr val="FFFFFF"/>
+                </a:solidFill>
+                <a:latin typeface="League Spartan Bold"/>
+              </a:endParaRPr>
+            </a:p>
+          </p:txBody>
+        </p:sp>
+      </p:grpSp>
+      <p:grpSp>
+        <p:nvGrpSpPr>
+          <p:cNvPr id="41" name="Grupo 40">
+            <a:extLst>
+              <a:ext uri="{FF2B5EF4-FFF2-40B4-BE49-F238E27FC236}">
+                <a16:creationId xmlns:a16="http://schemas.microsoft.com/office/drawing/2014/main" id="{D33EAB15-6406-A295-AFE0-010826D5F084}"/>
+              </a:ext>
+            </a:extLst>
+          </p:cNvPr>
+          <p:cNvGrpSpPr/>
+          <p:nvPr/>
+        </p:nvGrpSpPr>
+        <p:grpSpPr>
+          <a:xfrm>
+            <a:off x="7676360" y="3618351"/>
+            <a:ext cx="10266229" cy="2709355"/>
+            <a:chOff x="3832617" y="7215853"/>
+            <a:chExt cx="7551029" cy="1992788"/>
+          </a:xfrm>
+        </p:grpSpPr>
+        <p:sp>
+          <p:nvSpPr>
+            <p:cNvPr id="45" name="TextBox 37">
+              <a:extLst>
+                <a:ext uri="{FF2B5EF4-FFF2-40B4-BE49-F238E27FC236}">
+                  <a16:creationId xmlns:a16="http://schemas.microsoft.com/office/drawing/2014/main" id="{C6892393-07A1-917A-112B-2E88F484B940}"/>
+                </a:ext>
+              </a:extLst>
+            </p:cNvPr>
+            <p:cNvSpPr txBox="1"/>
+            <p:nvPr/>
+          </p:nvSpPr>
+          <p:spPr>
+            <a:xfrm>
+              <a:off x="3832617" y="7855352"/>
+              <a:ext cx="5650901" cy="815945"/>
+            </a:xfrm>
+            <a:prstGeom prst="rect">
+              <a:avLst/>
+            </a:prstGeom>
+          </p:spPr>
+          <p:txBody>
+            <a:bodyPr wrap="square" lIns="0" tIns="0" rIns="0" bIns="0" rtlCol="0" anchor="t">
+              <a:spAutoFit/>
+            </a:bodyPr>
+            <a:lstStyle/>
+            <a:p>
+              <a:pPr>
+                <a:lnSpc>
+                  <a:spcPts val="2800"/>
+                </a:lnSpc>
+              </a:pPr>
+              <a:r>
+                <a:rPr lang="en-US" sz="3600" b="1" dirty="0">
+                  <a:solidFill>
+                    <a:srgbClr val="FCFFFF"/>
+                  </a:solidFill>
+                  <a:latin typeface="League Spartan Bold"/>
+                </a:rPr>
+                <a:t>By. </a:t>
+              </a:r>
+              <a:r>
+                <a:rPr lang="en-US" sz="3600" b="1" dirty="0">
+                  <a:solidFill>
+                    <a:srgbClr val="FFFFFF"/>
+                  </a:solidFill>
+                  <a:latin typeface="League Spartan Bold"/>
+                </a:rPr>
+                <a:t>Oswaldo Emmanuel Fonseca Uribe</a:t>
+              </a:r>
+            </a:p>
+            <a:p>
+              <a:pPr>
+                <a:lnSpc>
+                  <a:spcPts val="2800"/>
+                </a:lnSpc>
+              </a:pPr>
+              <a:r>
+                <a:rPr lang="en-US" sz="3600" b="1" dirty="0" err="1">
+                  <a:solidFill>
+                    <a:srgbClr val="FFFFFF"/>
+                  </a:solidFill>
+                  <a:latin typeface="League Spartan Bold"/>
+                </a:rPr>
+                <a:t>Licenciatura</a:t>
+              </a:r>
+              <a:r>
+                <a:rPr lang="en-US" sz="3600" b="1" dirty="0">
+                  <a:solidFill>
+                    <a:srgbClr val="FFFFFF"/>
+                  </a:solidFill>
+                  <a:latin typeface="League Spartan Bold"/>
+                </a:rPr>
+                <a:t> e </a:t>
+              </a:r>
+              <a:r>
+                <a:rPr lang="en-US" sz="3600" b="1" dirty="0" err="1">
+                  <a:solidFill>
+                    <a:srgbClr val="FFFFFF"/>
+                  </a:solidFill>
+                  <a:latin typeface="League Spartan Bold"/>
+                </a:rPr>
+                <a:t>Ingeniería</a:t>
+              </a:r>
+              <a:r>
+                <a:rPr lang="en-US" sz="3600" b="1" dirty="0">
+                  <a:solidFill>
+                    <a:srgbClr val="FFFFFF"/>
+                  </a:solidFill>
+                  <a:latin typeface="League Spartan Bold"/>
+                </a:rPr>
+                <a:t> </a:t>
+              </a:r>
+              <a:r>
+                <a:rPr lang="en-US" sz="3600" b="1" dirty="0" err="1">
+                  <a:solidFill>
+                    <a:srgbClr val="FFFFFF"/>
+                  </a:solidFill>
+                  <a:latin typeface="League Spartan Bold"/>
+                </a:rPr>
+                <a:t>en</a:t>
+              </a:r>
+              <a:r>
+                <a:rPr lang="en-US" sz="3600" b="1" dirty="0">
+                  <a:solidFill>
+                    <a:srgbClr val="FFFFFF"/>
+                  </a:solidFill>
+                  <a:latin typeface="League Spartan Bold"/>
+                </a:rPr>
+                <a:t> </a:t>
+              </a:r>
+              <a:r>
+                <a:rPr lang="en-US" sz="3600" b="1" dirty="0" err="1">
+                  <a:solidFill>
+                    <a:srgbClr val="FFFFFF"/>
+                  </a:solidFill>
+                  <a:latin typeface="League Spartan Bold"/>
+                </a:rPr>
+                <a:t>Física</a:t>
+              </a:r>
+              <a:endParaRPr lang="en-US" sz="3600" b="1" dirty="0">
+                <a:solidFill>
+                  <a:srgbClr val="FFFFFF"/>
+                </a:solidFill>
+                <a:latin typeface="League Spartan Bold"/>
+              </a:endParaRPr>
+            </a:p>
+            <a:p>
+              <a:pPr>
+                <a:lnSpc>
+                  <a:spcPts val="2800"/>
+                </a:lnSpc>
+              </a:pPr>
+              <a:r>
+                <a:rPr lang="en-US" sz="3600" b="1" dirty="0">
+                  <a:solidFill>
+                    <a:srgbClr val="FFFFFF"/>
+                  </a:solidFill>
+                  <a:latin typeface="League Spartan Bold"/>
+                </a:rPr>
+                <a:t>7mo </a:t>
+              </a:r>
+              <a:r>
+                <a:rPr lang="en-US" sz="3600" b="1" dirty="0" err="1">
+                  <a:solidFill>
+                    <a:srgbClr val="FFFFFF"/>
+                  </a:solidFill>
+                  <a:latin typeface="League Spartan Bold"/>
+                </a:rPr>
+                <a:t>Semestre</a:t>
+              </a:r>
+              <a:endParaRPr lang="en-US" sz="3600" b="1" dirty="0">
+                <a:solidFill>
+                  <a:srgbClr val="FFFFFF"/>
+                </a:solidFill>
+                <a:latin typeface="League Spartan Bold"/>
+              </a:endParaRPr>
+            </a:p>
+          </p:txBody>
+        </p:sp>
+        <p:grpSp>
+          <p:nvGrpSpPr>
+            <p:cNvPr id="55" name="Grupo 54">
+              <a:extLst>
+                <a:ext uri="{FF2B5EF4-FFF2-40B4-BE49-F238E27FC236}">
+                  <a16:creationId xmlns:a16="http://schemas.microsoft.com/office/drawing/2014/main" id="{B00A3625-84B1-3CF6-C2E8-4665CB0AA2A5}"/>
+                </a:ext>
+              </a:extLst>
+            </p:cNvPr>
+            <p:cNvGrpSpPr/>
+            <p:nvPr/>
+          </p:nvGrpSpPr>
+          <p:grpSpPr>
+            <a:xfrm>
+              <a:off x="9138972" y="7215853"/>
+              <a:ext cx="2244674" cy="1992788"/>
+              <a:chOff x="9138972" y="7215853"/>
+              <a:chExt cx="2244674" cy="1992788"/>
+            </a:xfrm>
+          </p:grpSpPr>
+          <p:sp>
+            <p:nvSpPr>
+              <p:cNvPr id="56" name="Freeform 38">
+                <a:extLst>
+                  <a:ext uri="{FF2B5EF4-FFF2-40B4-BE49-F238E27FC236}">
+                    <a16:creationId xmlns:a16="http://schemas.microsoft.com/office/drawing/2014/main" id="{326D2AA4-52CE-CD21-EF8C-50151C4E3F40}"/>
+                  </a:ext>
+                </a:extLst>
+              </p:cNvPr>
+              <p:cNvSpPr/>
+              <p:nvPr/>
+            </p:nvSpPr>
+            <p:spPr>
+              <a:xfrm rot="1820298">
+                <a:off x="9138972" y="7240916"/>
+                <a:ext cx="2244674" cy="1942663"/>
+              </a:xfrm>
+              <a:custGeom>
+                <a:avLst/>
+                <a:gdLst/>
+                <a:ahLst/>
+                <a:cxnLst/>
+                <a:rect l="l" t="t" r="r" b="b"/>
+                <a:pathLst>
+                  <a:path w="2244674" h="1942663">
+                    <a:moveTo>
+                      <a:pt x="0" y="0"/>
+                    </a:moveTo>
+                    <a:lnTo>
+                      <a:pt x="2244675" y="0"/>
+                    </a:lnTo>
+                    <a:lnTo>
+                      <a:pt x="2244675" y="1942664"/>
+                    </a:lnTo>
+                    <a:lnTo>
+                      <a:pt x="0" y="1942664"/>
+                    </a:lnTo>
+                    <a:lnTo>
+                      <a:pt x="0" y="0"/>
+                    </a:lnTo>
+                    <a:close/>
+                  </a:path>
+                </a:pathLst>
+              </a:custGeom>
+              <a:blipFill>
+                <a:blip r:embed="rId18">
+                  <a:extLst>
+                    <a:ext uri="{96DAC541-7B7A-43D3-8B79-37D633B846F1}">
+                      <asvg:svgBlip xmlns:asvg="http://schemas.microsoft.com/office/drawing/2016/SVG/main" r:embed="rId19"/>
+                    </a:ext>
+                  </a:extLst>
+                </a:blip>
+                <a:stretch>
+                  <a:fillRect/>
+                </a:stretch>
+              </a:blipFill>
+            </p:spPr>
+            <p:txBody>
+              <a:bodyPr/>
+              <a:lstStyle/>
+              <a:p>
+                <a:endParaRPr lang="es-MX"/>
+              </a:p>
+            </p:txBody>
+          </p:sp>
+          <p:grpSp>
+            <p:nvGrpSpPr>
+              <p:cNvPr id="57" name="Group 39">
+                <a:extLst>
+                  <a:ext uri="{FF2B5EF4-FFF2-40B4-BE49-F238E27FC236}">
+                    <a16:creationId xmlns:a16="http://schemas.microsoft.com/office/drawing/2014/main" id="{39F2F10A-0590-59D0-61DA-C8DF90AF493B}"/>
+                  </a:ext>
+                </a:extLst>
+              </p:cNvPr>
+              <p:cNvGrpSpPr/>
+              <p:nvPr/>
+            </p:nvGrpSpPr>
+            <p:grpSpPr>
+              <a:xfrm>
+                <a:off x="9405032" y="7215853"/>
+                <a:ext cx="1712552" cy="1992788"/>
+                <a:chOff x="3110014" y="-56784"/>
+                <a:chExt cx="698500" cy="812800"/>
+              </a:xfrm>
+            </p:grpSpPr>
+            <p:sp>
+              <p:nvSpPr>
+                <p:cNvPr id="58" name="Freeform 40">
+                  <a:extLst>
+                    <a:ext uri="{FF2B5EF4-FFF2-40B4-BE49-F238E27FC236}">
+                      <a16:creationId xmlns:a16="http://schemas.microsoft.com/office/drawing/2014/main" id="{163DEDEE-0F22-0572-8DAE-4DDCE6C040CD}"/>
+                    </a:ext>
+                  </a:extLst>
+                </p:cNvPr>
+                <p:cNvSpPr/>
+                <p:nvPr/>
+              </p:nvSpPr>
+              <p:spPr>
+                <a:xfrm>
+                  <a:off x="3110014" y="-56784"/>
+                  <a:ext cx="698500" cy="812800"/>
+                </a:xfrm>
+                <a:custGeom>
+                  <a:avLst/>
+                  <a:gdLst/>
+                  <a:ahLst/>
+                  <a:cxnLst/>
+                  <a:rect l="l" t="t" r="r" b="b"/>
+                  <a:pathLst>
+                    <a:path w="698500" h="812800">
+                      <a:moveTo>
+                        <a:pt x="349250" y="0"/>
+                      </a:moveTo>
+                      <a:lnTo>
+                        <a:pt x="698500" y="203200"/>
+                      </a:lnTo>
+                      <a:lnTo>
+                        <a:pt x="698500" y="609600"/>
+                      </a:lnTo>
+                      <a:lnTo>
+                        <a:pt x="349250" y="812800"/>
+                      </a:lnTo>
+                      <a:lnTo>
+                        <a:pt x="0" y="609600"/>
+                      </a:lnTo>
+                      <a:lnTo>
+                        <a:pt x="0" y="203200"/>
+                      </a:lnTo>
+                      <a:lnTo>
+                        <a:pt x="349250" y="0"/>
+                      </a:lnTo>
+                      <a:close/>
+                    </a:path>
+                  </a:pathLst>
+                </a:custGeom>
+                <a:blipFill>
+                  <a:blip r:embed="rId20"/>
+                  <a:stretch>
+                    <a:fillRect l="-116442" t="-73005" r="-63385" b="-67471"/>
+                  </a:stretch>
+                </a:blipFill>
+              </p:spPr>
+              <p:txBody>
+                <a:bodyPr/>
+                <a:lstStyle/>
+                <a:p>
+                  <a:endParaRPr lang="es-MX"/>
+                </a:p>
+              </p:txBody>
+            </p:sp>
+          </p:grpSp>
+        </p:grpSp>
+      </p:grpSp>
+      <p:grpSp>
+        <p:nvGrpSpPr>
+          <p:cNvPr id="59" name="Grupo 58">
+            <a:extLst>
+              <a:ext uri="{FF2B5EF4-FFF2-40B4-BE49-F238E27FC236}">
+                <a16:creationId xmlns:a16="http://schemas.microsoft.com/office/drawing/2014/main" id="{756FF14C-4D14-15F9-1E61-B42E014026FE}"/>
+              </a:ext>
+            </a:extLst>
+          </p:cNvPr>
+          <p:cNvGrpSpPr/>
+          <p:nvPr/>
+        </p:nvGrpSpPr>
+        <p:grpSpPr>
+          <a:xfrm>
+            <a:off x="7697040" y="5938580"/>
+            <a:ext cx="6691514" cy="1577014"/>
+            <a:chOff x="654559" y="6115093"/>
+            <a:chExt cx="8452760" cy="1992094"/>
+          </a:xfrm>
+        </p:grpSpPr>
+        <p:sp>
+          <p:nvSpPr>
+            <p:cNvPr id="60" name="Freeform 11">
+              <a:extLst>
+                <a:ext uri="{FF2B5EF4-FFF2-40B4-BE49-F238E27FC236}">
+                  <a16:creationId xmlns:a16="http://schemas.microsoft.com/office/drawing/2014/main" id="{91620466-8BE9-2456-2F74-D3E088DE996B}"/>
+                </a:ext>
+              </a:extLst>
+            </p:cNvPr>
+            <p:cNvSpPr/>
+            <p:nvPr/>
+          </p:nvSpPr>
+          <p:spPr>
+            <a:xfrm>
+              <a:off x="654559" y="6288098"/>
+              <a:ext cx="1848665" cy="1819089"/>
+            </a:xfrm>
+            <a:custGeom>
+              <a:avLst/>
+              <a:gdLst/>
+              <a:ahLst/>
+              <a:cxnLst/>
+              <a:rect l="l" t="t" r="r" b="b"/>
+              <a:pathLst>
+                <a:path w="698472" h="687297">
+                  <a:moveTo>
+                    <a:pt x="0" y="0"/>
+                  </a:moveTo>
+                  <a:lnTo>
+                    <a:pt x="698472" y="0"/>
+                  </a:lnTo>
+                  <a:lnTo>
+                    <a:pt x="698472" y="687297"/>
+                  </a:lnTo>
+                  <a:lnTo>
+                    <a:pt x="0" y="687297"/>
+                  </a:lnTo>
+                  <a:lnTo>
+                    <a:pt x="0" y="0"/>
+                  </a:lnTo>
+                  <a:close/>
+                </a:path>
+              </a:pathLst>
+            </a:custGeom>
+            <a:blipFill>
+              <a:blip r:embed="rId6"/>
+              <a:stretch>
+                <a:fillRect/>
+              </a:stretch>
+            </a:blipFill>
+          </p:spPr>
+          <p:txBody>
+            <a:bodyPr/>
+            <a:lstStyle/>
+            <a:p>
+              <a:endParaRPr lang="es-MX" dirty="0"/>
+            </a:p>
+          </p:txBody>
+        </p:sp>
+        <p:sp>
+          <p:nvSpPr>
+            <p:cNvPr id="61" name="TextBox 43">
+              <a:extLst>
+                <a:ext uri="{FF2B5EF4-FFF2-40B4-BE49-F238E27FC236}">
+                  <a16:creationId xmlns:a16="http://schemas.microsoft.com/office/drawing/2014/main" id="{AA1B447E-F3B6-F6D4-AF72-511B086BAF08}"/>
+                </a:ext>
+              </a:extLst>
+            </p:cNvPr>
+            <p:cNvSpPr txBox="1"/>
+            <p:nvPr/>
+          </p:nvSpPr>
+          <p:spPr>
+            <a:xfrm>
+              <a:off x="2802509" y="6115093"/>
+              <a:ext cx="6304810" cy="1094530"/>
+            </a:xfrm>
+            <a:prstGeom prst="rect">
+              <a:avLst/>
+            </a:prstGeom>
+          </p:spPr>
+          <p:txBody>
+            <a:bodyPr wrap="square" lIns="0" tIns="0" rIns="0" bIns="0" rtlCol="0" anchor="t">
+              <a:spAutoFit/>
+            </a:bodyPr>
+            <a:lstStyle/>
+            <a:p>
+              <a:pPr>
+                <a:lnSpc>
+                  <a:spcPts val="10080"/>
+                </a:lnSpc>
+                <a:spcBef>
+                  <a:spcPct val="0"/>
+                </a:spcBef>
+              </a:pPr>
+              <a:r>
+                <a:rPr lang="en-US" sz="3200" dirty="0" err="1">
+                  <a:latin typeface="League Spartan Bold"/>
+                </a:rPr>
+                <a:t>OswiFUribe</a:t>
+              </a:r>
+              <a:r>
+                <a:rPr lang="en-US" sz="3200" dirty="0">
+                  <a:latin typeface="League Spartan Bold"/>
+                </a:rPr>
+                <a:t>/</a:t>
+              </a:r>
+              <a:r>
+                <a:rPr lang="en-US" sz="3200" dirty="0" err="1">
+                  <a:latin typeface="League Spartan Bold"/>
+                </a:rPr>
+                <a:t>TinyML_BeePy</a:t>
+              </a:r>
+              <a:endParaRPr lang="en-US" sz="3200" dirty="0">
+                <a:latin typeface="League Spartan Bold"/>
+              </a:endParaRPr>
+            </a:p>
+          </p:txBody>
+        </p:sp>
+      </p:grpSp>
+      <p:grpSp>
+        <p:nvGrpSpPr>
+          <p:cNvPr id="67" name="Grupo 66">
+            <a:extLst>
+              <a:ext uri="{FF2B5EF4-FFF2-40B4-BE49-F238E27FC236}">
+                <a16:creationId xmlns:a16="http://schemas.microsoft.com/office/drawing/2014/main" id="{AE4CFBC8-CF60-2B0C-0D91-CB2F5C0AECC0}"/>
+              </a:ext>
+            </a:extLst>
+          </p:cNvPr>
+          <p:cNvGrpSpPr/>
+          <p:nvPr/>
+        </p:nvGrpSpPr>
+        <p:grpSpPr>
+          <a:xfrm>
+            <a:off x="7720453" y="7651154"/>
+            <a:ext cx="6607821" cy="1646280"/>
+            <a:chOff x="8827105" y="7792564"/>
+            <a:chExt cx="6607821" cy="1646280"/>
+          </a:xfrm>
+        </p:grpSpPr>
+        <p:pic>
+          <p:nvPicPr>
+            <p:cNvPr id="1026" name="Picture 2">
+              <a:extLst>
+                <a:ext uri="{FF2B5EF4-FFF2-40B4-BE49-F238E27FC236}">
+                  <a16:creationId xmlns:a16="http://schemas.microsoft.com/office/drawing/2014/main" id="{BCA67D02-F185-F856-055C-F31DD6180FA7}"/>
+                </a:ext>
+              </a:extLst>
+            </p:cNvPr>
+            <p:cNvPicPr>
+              <a:picLocks noChangeAspect="1" noChangeArrowheads="1"/>
+            </p:cNvPicPr>
+            <p:nvPr/>
+          </p:nvPicPr>
+          <p:blipFill>
+            <a:blip r:embed="rId21">
+              <a:extLst>
+                <a:ext uri="{28A0092B-C50C-407E-A947-70E740481C1C}">
+                  <a14:useLocalDpi xmlns:a14="http://schemas.microsoft.com/office/drawing/2010/main" val="0"/>
+                </a:ext>
+              </a:extLst>
+            </a:blip>
+            <a:srcRect/>
+            <a:stretch>
+              <a:fillRect/>
+            </a:stretch>
+          </p:blipFill>
+          <p:spPr bwMode="auto">
+            <a:xfrm>
+              <a:off x="8827105" y="7998786"/>
+              <a:ext cx="1440058" cy="1440058"/>
+            </a:xfrm>
+            <a:prstGeom prst="rect">
+              <a:avLst/>
+            </a:prstGeom>
+            <a:noFill/>
+            <a:extLst>
+              <a:ext uri="{909E8E84-426E-40DD-AFC4-6F175D3DCCD1}">
+                <a14:hiddenFill xmlns:a14="http://schemas.microsoft.com/office/drawing/2010/main">
+                  <a:solidFill>
+                    <a:srgbClr val="FFFFFF"/>
+                  </a:solidFill>
+                </a14:hiddenFill>
+              </a:ext>
+            </a:extLst>
+          </p:spPr>
+        </p:pic>
+        <p:sp>
+          <p:nvSpPr>
+            <p:cNvPr id="66" name="TextBox 43">
+              <a:extLst>
+                <a:ext uri="{FF2B5EF4-FFF2-40B4-BE49-F238E27FC236}">
+                  <a16:creationId xmlns:a16="http://schemas.microsoft.com/office/drawing/2014/main" id="{E9017C97-3DF3-F6C5-13C4-C62248D23049}"/>
+                </a:ext>
+              </a:extLst>
+            </p:cNvPr>
+            <p:cNvSpPr txBox="1"/>
+            <p:nvPr/>
+          </p:nvSpPr>
+          <p:spPr>
+            <a:xfrm>
+              <a:off x="10443808" y="7792564"/>
+              <a:ext cx="4991118" cy="1079783"/>
+            </a:xfrm>
+            <a:prstGeom prst="rect">
+              <a:avLst/>
+            </a:prstGeom>
+          </p:spPr>
+          <p:txBody>
+            <a:bodyPr wrap="square" lIns="0" tIns="0" rIns="0" bIns="0" rtlCol="0" anchor="t">
+              <a:spAutoFit/>
+            </a:bodyPr>
+            <a:lstStyle/>
+            <a:p>
+              <a:pPr>
+                <a:lnSpc>
+                  <a:spcPts val="10080"/>
+                </a:lnSpc>
+                <a:spcBef>
+                  <a:spcPct val="0"/>
+                </a:spcBef>
+              </a:pPr>
+              <a:r>
+                <a:rPr lang="en-US" sz="3200" dirty="0">
+                  <a:latin typeface="League Spartan Bold"/>
+                </a:rPr>
+                <a:t>@oswideus</a:t>
+              </a:r>
+            </a:p>
+          </p:txBody>
+        </p:sp>
+      </p:grpSp>
+    </p:spTree>
+    <p:extLst>
+      <p:ext uri="{BB962C8B-B14F-4D97-AF65-F5344CB8AC3E}">
+        <p14:creationId xmlns:p14="http://schemas.microsoft.com/office/powerpoint/2010/main" val="838400515"/>
+      </p:ext>
+    </p:extLst>
+  </p:cSld>
+  <p:clrMapOvr>
+    <a:masterClrMapping/>
+  </p:clrMapOvr>
   <mc:AlternateContent xmlns:mc="http://schemas.openxmlformats.org/markup-compatibility/2006">
     <mc:Choice xmlns:p159="http://schemas.microsoft.com/office/powerpoint/2015/09/main" Requires="p159">
       <p:transition xmlns:p14="http://schemas.microsoft.com/office/powerpoint/2010/main" spd="slow" p14:dur="2000">

</xml_diff>